<commit_message>
<Orientation Class files revised and updated as per need>
</commit_message>
<xml_diff>
--- a/_01_Orientation_Class/Class_00.pptx
+++ b/_01_Orientation_Class/Class_00.pptx
@@ -5,7 +5,7 @@
     <p:sldMasterId id="2147483648" r:id="rId1"/>
   </p:sldMasterIdLst>
   <p:notesMasterIdLst>
-    <p:notesMasterId r:id="rId15"/>
+    <p:notesMasterId r:id="rId10"/>
   </p:notesMasterIdLst>
   <p:sldIdLst>
     <p:sldId id="268" r:id="rId2"/>
@@ -15,12 +15,7 @@
     <p:sldId id="256" r:id="rId6"/>
     <p:sldId id="257" r:id="rId7"/>
     <p:sldId id="258" r:id="rId8"/>
-    <p:sldId id="259" r:id="rId9"/>
-    <p:sldId id="260" r:id="rId10"/>
-    <p:sldId id="261" r:id="rId11"/>
-    <p:sldId id="262" r:id="rId12"/>
-    <p:sldId id="263" r:id="rId13"/>
-    <p:sldId id="264" r:id="rId14"/>
+    <p:sldId id="269" r:id="rId9"/>
   </p:sldIdLst>
   <p:sldSz cx="12192000" cy="6858000"/>
   <p:notesSz cx="6858000" cy="9144000"/>
@@ -209,7 +204,7 @@
           <a:p>
             <a:fld id="{7B15B548-855C-4993-8F8A-A7722165871E}" type="datetimeFigureOut">
               <a:rPr lang="en-US" smtClean="0"/>
-              <a:t>11/27/2022</a:t>
+              <a:t>6/4/2023</a:t>
             </a:fld>
             <a:endParaRPr lang="en-US"/>
           </a:p>
@@ -273,38 +268,37 @@
           <a:p>
             <a:pPr lvl="0"/>
             <a:r>
-              <a:rPr lang="en-US" smtClean="0"/>
+              <a:rPr lang="en-US"/>
               <a:t>Edit Master text styles</a:t>
             </a:r>
           </a:p>
           <a:p>
             <a:pPr lvl="1"/>
             <a:r>
-              <a:rPr lang="en-US" smtClean="0"/>
+              <a:rPr lang="en-US"/>
               <a:t>Second level</a:t>
             </a:r>
           </a:p>
           <a:p>
             <a:pPr lvl="2"/>
             <a:r>
-              <a:rPr lang="en-US" smtClean="0"/>
+              <a:rPr lang="en-US"/>
               <a:t>Third level</a:t>
             </a:r>
           </a:p>
           <a:p>
             <a:pPr lvl="3"/>
             <a:r>
-              <a:rPr lang="en-US" smtClean="0"/>
+              <a:rPr lang="en-US"/>
               <a:t>Fourth level</a:t>
             </a:r>
           </a:p>
           <a:p>
             <a:pPr lvl="4"/>
             <a:r>
-              <a:rPr lang="en-US" smtClean="0"/>
+              <a:rPr lang="en-US"/>
               <a:t>Fifth level</a:t>
             </a:r>
-            <a:endParaRPr lang="en-US"/>
           </a:p>
         </p:txBody>
       </p:sp>
@@ -603,10 +597,9 @@
           </a:lstStyle>
           <a:p>
             <a:r>
-              <a:rPr lang="en-US" smtClean="0"/>
+              <a:rPr lang="en-US"/>
               <a:t>Click to edit Master title style</a:t>
             </a:r>
-            <a:endParaRPr lang="en-US"/>
           </a:p>
         </p:txBody>
       </p:sp>
@@ -668,10 +661,9 @@
           </a:lstStyle>
           <a:p>
             <a:r>
-              <a:rPr lang="en-US" smtClean="0"/>
+              <a:rPr lang="en-US"/>
               <a:t>Click to edit Master subtitle style</a:t>
             </a:r>
-            <a:endParaRPr lang="en-US"/>
           </a:p>
         </p:txBody>
       </p:sp>
@@ -692,7 +684,7 @@
           <a:p>
             <a:fld id="{3FAB681F-8935-486B-A8D2-5DA5ACD50193}" type="datetimeFigureOut">
               <a:rPr lang="en-US" smtClean="0"/>
-              <a:t>11/27/2022</a:t>
+              <a:t>6/4/2023</a:t>
             </a:fld>
             <a:endParaRPr lang="en-US"/>
           </a:p>
@@ -786,10 +778,9 @@
           <a:lstStyle/>
           <a:p>
             <a:r>
-              <a:rPr lang="en-US" smtClean="0"/>
+              <a:rPr lang="en-US"/>
               <a:t>Click to edit Master title style</a:t>
             </a:r>
-            <a:endParaRPr lang="en-US"/>
           </a:p>
         </p:txBody>
       </p:sp>
@@ -810,38 +801,37 @@
           <a:p>
             <a:pPr lvl="0"/>
             <a:r>
-              <a:rPr lang="en-US" smtClean="0"/>
+              <a:rPr lang="en-US"/>
               <a:t>Edit Master text styles</a:t>
             </a:r>
           </a:p>
           <a:p>
             <a:pPr lvl="1"/>
             <a:r>
-              <a:rPr lang="en-US" smtClean="0"/>
+              <a:rPr lang="en-US"/>
               <a:t>Second level</a:t>
             </a:r>
           </a:p>
           <a:p>
             <a:pPr lvl="2"/>
             <a:r>
-              <a:rPr lang="en-US" smtClean="0"/>
+              <a:rPr lang="en-US"/>
               <a:t>Third level</a:t>
             </a:r>
           </a:p>
           <a:p>
             <a:pPr lvl="3"/>
             <a:r>
-              <a:rPr lang="en-US" smtClean="0"/>
+              <a:rPr lang="en-US"/>
               <a:t>Fourth level</a:t>
             </a:r>
           </a:p>
           <a:p>
             <a:pPr lvl="4"/>
             <a:r>
-              <a:rPr lang="en-US" smtClean="0"/>
+              <a:rPr lang="en-US"/>
               <a:t>Fifth level</a:t>
             </a:r>
-            <a:endParaRPr lang="en-US"/>
           </a:p>
         </p:txBody>
       </p:sp>
@@ -862,7 +852,7 @@
           <a:p>
             <a:fld id="{3FAB681F-8935-486B-A8D2-5DA5ACD50193}" type="datetimeFigureOut">
               <a:rPr lang="en-US" smtClean="0"/>
-              <a:t>11/27/2022</a:t>
+              <a:t>6/4/2023</a:t>
             </a:fld>
             <a:endParaRPr lang="en-US"/>
           </a:p>
@@ -961,10 +951,9 @@
           <a:lstStyle/>
           <a:p>
             <a:r>
-              <a:rPr lang="en-US" smtClean="0"/>
+              <a:rPr lang="en-US"/>
               <a:t>Click to edit Master title style</a:t>
             </a:r>
-            <a:endParaRPr lang="en-US"/>
           </a:p>
         </p:txBody>
       </p:sp>
@@ -990,38 +979,37 @@
           <a:p>
             <a:pPr lvl="0"/>
             <a:r>
-              <a:rPr lang="en-US" smtClean="0"/>
+              <a:rPr lang="en-US"/>
               <a:t>Edit Master text styles</a:t>
             </a:r>
           </a:p>
           <a:p>
             <a:pPr lvl="1"/>
             <a:r>
-              <a:rPr lang="en-US" smtClean="0"/>
+              <a:rPr lang="en-US"/>
               <a:t>Second level</a:t>
             </a:r>
           </a:p>
           <a:p>
             <a:pPr lvl="2"/>
             <a:r>
-              <a:rPr lang="en-US" smtClean="0"/>
+              <a:rPr lang="en-US"/>
               <a:t>Third level</a:t>
             </a:r>
           </a:p>
           <a:p>
             <a:pPr lvl="3"/>
             <a:r>
-              <a:rPr lang="en-US" smtClean="0"/>
+              <a:rPr lang="en-US"/>
               <a:t>Fourth level</a:t>
             </a:r>
           </a:p>
           <a:p>
             <a:pPr lvl="4"/>
             <a:r>
-              <a:rPr lang="en-US" smtClean="0"/>
+              <a:rPr lang="en-US"/>
               <a:t>Fifth level</a:t>
             </a:r>
-            <a:endParaRPr lang="en-US"/>
           </a:p>
         </p:txBody>
       </p:sp>
@@ -1042,7 +1030,7 @@
           <a:p>
             <a:fld id="{3FAB681F-8935-486B-A8D2-5DA5ACD50193}" type="datetimeFigureOut">
               <a:rPr lang="en-US" smtClean="0"/>
-              <a:t>11/27/2022</a:t>
+              <a:t>6/4/2023</a:t>
             </a:fld>
             <a:endParaRPr lang="en-US"/>
           </a:p>
@@ -1136,10 +1124,9 @@
           <a:lstStyle/>
           <a:p>
             <a:r>
-              <a:rPr lang="en-US" smtClean="0"/>
+              <a:rPr lang="en-US"/>
               <a:t>Click to edit Master title style</a:t>
             </a:r>
-            <a:endParaRPr lang="en-US"/>
           </a:p>
         </p:txBody>
       </p:sp>
@@ -1160,38 +1147,37 @@
           <a:p>
             <a:pPr lvl="0"/>
             <a:r>
-              <a:rPr lang="en-US" smtClean="0"/>
+              <a:rPr lang="en-US"/>
               <a:t>Edit Master text styles</a:t>
             </a:r>
           </a:p>
           <a:p>
             <a:pPr lvl="1"/>
             <a:r>
-              <a:rPr lang="en-US" smtClean="0"/>
+              <a:rPr lang="en-US"/>
               <a:t>Second level</a:t>
             </a:r>
           </a:p>
           <a:p>
             <a:pPr lvl="2"/>
             <a:r>
-              <a:rPr lang="en-US" smtClean="0"/>
+              <a:rPr lang="en-US"/>
               <a:t>Third level</a:t>
             </a:r>
           </a:p>
           <a:p>
             <a:pPr lvl="3"/>
             <a:r>
-              <a:rPr lang="en-US" smtClean="0"/>
+              <a:rPr lang="en-US"/>
               <a:t>Fourth level</a:t>
             </a:r>
           </a:p>
           <a:p>
             <a:pPr lvl="4"/>
             <a:r>
-              <a:rPr lang="en-US" smtClean="0"/>
+              <a:rPr lang="en-US"/>
               <a:t>Fifth level</a:t>
             </a:r>
-            <a:endParaRPr lang="en-US"/>
           </a:p>
         </p:txBody>
       </p:sp>
@@ -1212,7 +1198,7 @@
           <a:p>
             <a:fld id="{3FAB681F-8935-486B-A8D2-5DA5ACD50193}" type="datetimeFigureOut">
               <a:rPr lang="en-US" smtClean="0"/>
-              <a:t>11/27/2022</a:t>
+              <a:t>6/4/2023</a:t>
             </a:fld>
             <a:endParaRPr lang="en-US"/>
           </a:p>
@@ -1315,10 +1301,9 @@
           </a:lstStyle>
           <a:p>
             <a:r>
-              <a:rPr lang="en-US" smtClean="0"/>
+              <a:rPr lang="en-US"/>
               <a:t>Click to edit Master title style</a:t>
             </a:r>
-            <a:endParaRPr lang="en-US"/>
           </a:p>
         </p:txBody>
       </p:sp>
@@ -1435,7 +1420,7 @@
           <a:p>
             <a:pPr lvl="0"/>
             <a:r>
-              <a:rPr lang="en-US" smtClean="0"/>
+              <a:rPr lang="en-US"/>
               <a:t>Edit Master text styles</a:t>
             </a:r>
           </a:p>
@@ -1458,7 +1443,7 @@
           <a:p>
             <a:fld id="{3FAB681F-8935-486B-A8D2-5DA5ACD50193}" type="datetimeFigureOut">
               <a:rPr lang="en-US" smtClean="0"/>
-              <a:t>11/27/2022</a:t>
+              <a:t>6/4/2023</a:t>
             </a:fld>
             <a:endParaRPr lang="en-US"/>
           </a:p>
@@ -1552,10 +1537,9 @@
           <a:lstStyle/>
           <a:p>
             <a:r>
-              <a:rPr lang="en-US" smtClean="0"/>
+              <a:rPr lang="en-US"/>
               <a:t>Click to edit Master title style</a:t>
             </a:r>
-            <a:endParaRPr lang="en-US"/>
           </a:p>
         </p:txBody>
       </p:sp>
@@ -1581,38 +1565,37 @@
           <a:p>
             <a:pPr lvl="0"/>
             <a:r>
-              <a:rPr lang="en-US" smtClean="0"/>
+              <a:rPr lang="en-US"/>
               <a:t>Edit Master text styles</a:t>
             </a:r>
           </a:p>
           <a:p>
             <a:pPr lvl="1"/>
             <a:r>
-              <a:rPr lang="en-US" smtClean="0"/>
+              <a:rPr lang="en-US"/>
               <a:t>Second level</a:t>
             </a:r>
           </a:p>
           <a:p>
             <a:pPr lvl="2"/>
             <a:r>
-              <a:rPr lang="en-US" smtClean="0"/>
+              <a:rPr lang="en-US"/>
               <a:t>Third level</a:t>
             </a:r>
           </a:p>
           <a:p>
             <a:pPr lvl="3"/>
             <a:r>
-              <a:rPr lang="en-US" smtClean="0"/>
+              <a:rPr lang="en-US"/>
               <a:t>Fourth level</a:t>
             </a:r>
           </a:p>
           <a:p>
             <a:pPr lvl="4"/>
             <a:r>
-              <a:rPr lang="en-US" smtClean="0"/>
+              <a:rPr lang="en-US"/>
               <a:t>Fifth level</a:t>
             </a:r>
-            <a:endParaRPr lang="en-US"/>
           </a:p>
         </p:txBody>
       </p:sp>
@@ -1638,38 +1621,37 @@
           <a:p>
             <a:pPr lvl="0"/>
             <a:r>
-              <a:rPr lang="en-US" smtClean="0"/>
+              <a:rPr lang="en-US"/>
               <a:t>Edit Master text styles</a:t>
             </a:r>
           </a:p>
           <a:p>
             <a:pPr lvl="1"/>
             <a:r>
-              <a:rPr lang="en-US" smtClean="0"/>
+              <a:rPr lang="en-US"/>
               <a:t>Second level</a:t>
             </a:r>
           </a:p>
           <a:p>
             <a:pPr lvl="2"/>
             <a:r>
-              <a:rPr lang="en-US" smtClean="0"/>
+              <a:rPr lang="en-US"/>
               <a:t>Third level</a:t>
             </a:r>
           </a:p>
           <a:p>
             <a:pPr lvl="3"/>
             <a:r>
-              <a:rPr lang="en-US" smtClean="0"/>
+              <a:rPr lang="en-US"/>
               <a:t>Fourth level</a:t>
             </a:r>
           </a:p>
           <a:p>
             <a:pPr lvl="4"/>
             <a:r>
-              <a:rPr lang="en-US" smtClean="0"/>
+              <a:rPr lang="en-US"/>
               <a:t>Fifth level</a:t>
             </a:r>
-            <a:endParaRPr lang="en-US"/>
           </a:p>
         </p:txBody>
       </p:sp>
@@ -1690,7 +1672,7 @@
           <a:p>
             <a:fld id="{3FAB681F-8935-486B-A8D2-5DA5ACD50193}" type="datetimeFigureOut">
               <a:rPr lang="en-US" smtClean="0"/>
-              <a:t>11/27/2022</a:t>
+              <a:t>6/4/2023</a:t>
             </a:fld>
             <a:endParaRPr lang="en-US"/>
           </a:p>
@@ -1789,10 +1771,9 @@
           <a:lstStyle/>
           <a:p>
             <a:r>
-              <a:rPr lang="en-US" smtClean="0"/>
+              <a:rPr lang="en-US"/>
               <a:t>Click to edit Master title style</a:t>
             </a:r>
-            <a:endParaRPr lang="en-US"/>
           </a:p>
         </p:txBody>
       </p:sp>
@@ -1855,7 +1836,7 @@
           <a:p>
             <a:pPr lvl="0"/>
             <a:r>
-              <a:rPr lang="en-US" smtClean="0"/>
+              <a:rPr lang="en-US"/>
               <a:t>Edit Master text styles</a:t>
             </a:r>
           </a:p>
@@ -1883,38 +1864,37 @@
           <a:p>
             <a:pPr lvl="0"/>
             <a:r>
-              <a:rPr lang="en-US" smtClean="0"/>
+              <a:rPr lang="en-US"/>
               <a:t>Edit Master text styles</a:t>
             </a:r>
           </a:p>
           <a:p>
             <a:pPr lvl="1"/>
             <a:r>
-              <a:rPr lang="en-US" smtClean="0"/>
+              <a:rPr lang="en-US"/>
               <a:t>Second level</a:t>
             </a:r>
           </a:p>
           <a:p>
             <a:pPr lvl="2"/>
             <a:r>
-              <a:rPr lang="en-US" smtClean="0"/>
+              <a:rPr lang="en-US"/>
               <a:t>Third level</a:t>
             </a:r>
           </a:p>
           <a:p>
             <a:pPr lvl="3"/>
             <a:r>
-              <a:rPr lang="en-US" smtClean="0"/>
+              <a:rPr lang="en-US"/>
               <a:t>Fourth level</a:t>
             </a:r>
           </a:p>
           <a:p>
             <a:pPr lvl="4"/>
             <a:r>
-              <a:rPr lang="en-US" smtClean="0"/>
+              <a:rPr lang="en-US"/>
               <a:t>Fifth level</a:t>
             </a:r>
-            <a:endParaRPr lang="en-US"/>
           </a:p>
         </p:txBody>
       </p:sp>
@@ -1977,7 +1957,7 @@
           <a:p>
             <a:pPr lvl="0"/>
             <a:r>
-              <a:rPr lang="en-US" smtClean="0"/>
+              <a:rPr lang="en-US"/>
               <a:t>Edit Master text styles</a:t>
             </a:r>
           </a:p>
@@ -2005,38 +1985,37 @@
           <a:p>
             <a:pPr lvl="0"/>
             <a:r>
-              <a:rPr lang="en-US" smtClean="0"/>
+              <a:rPr lang="en-US"/>
               <a:t>Edit Master text styles</a:t>
             </a:r>
           </a:p>
           <a:p>
             <a:pPr lvl="1"/>
             <a:r>
-              <a:rPr lang="en-US" smtClean="0"/>
+              <a:rPr lang="en-US"/>
               <a:t>Second level</a:t>
             </a:r>
           </a:p>
           <a:p>
             <a:pPr lvl="2"/>
             <a:r>
-              <a:rPr lang="en-US" smtClean="0"/>
+              <a:rPr lang="en-US"/>
               <a:t>Third level</a:t>
             </a:r>
           </a:p>
           <a:p>
             <a:pPr lvl="3"/>
             <a:r>
-              <a:rPr lang="en-US" smtClean="0"/>
+              <a:rPr lang="en-US"/>
               <a:t>Fourth level</a:t>
             </a:r>
           </a:p>
           <a:p>
             <a:pPr lvl="4"/>
             <a:r>
-              <a:rPr lang="en-US" smtClean="0"/>
+              <a:rPr lang="en-US"/>
               <a:t>Fifth level</a:t>
             </a:r>
-            <a:endParaRPr lang="en-US"/>
           </a:p>
         </p:txBody>
       </p:sp>
@@ -2057,7 +2036,7 @@
           <a:p>
             <a:fld id="{3FAB681F-8935-486B-A8D2-5DA5ACD50193}" type="datetimeFigureOut">
               <a:rPr lang="en-US" smtClean="0"/>
-              <a:t>11/27/2022</a:t>
+              <a:t>6/4/2023</a:t>
             </a:fld>
             <a:endParaRPr lang="en-US"/>
           </a:p>
@@ -2151,10 +2130,9 @@
           <a:lstStyle/>
           <a:p>
             <a:r>
-              <a:rPr lang="en-US" smtClean="0"/>
+              <a:rPr lang="en-US"/>
               <a:t>Click to edit Master title style</a:t>
             </a:r>
-            <a:endParaRPr lang="en-US"/>
           </a:p>
         </p:txBody>
       </p:sp>
@@ -2175,7 +2153,7 @@
           <a:p>
             <a:fld id="{3FAB681F-8935-486B-A8D2-5DA5ACD50193}" type="datetimeFigureOut">
               <a:rPr lang="en-US" smtClean="0"/>
-              <a:t>11/27/2022</a:t>
+              <a:t>6/4/2023</a:t>
             </a:fld>
             <a:endParaRPr lang="en-US"/>
           </a:p>
@@ -2270,7 +2248,7 @@
           <a:p>
             <a:fld id="{3FAB681F-8935-486B-A8D2-5DA5ACD50193}" type="datetimeFigureOut">
               <a:rPr lang="en-US" smtClean="0"/>
-              <a:t>11/27/2022</a:t>
+              <a:t>6/4/2023</a:t>
             </a:fld>
             <a:endParaRPr lang="en-US"/>
           </a:p>
@@ -2373,10 +2351,9 @@
           </a:lstStyle>
           <a:p>
             <a:r>
-              <a:rPr lang="en-US" smtClean="0"/>
+              <a:rPr lang="en-US"/>
               <a:t>Click to edit Master title style</a:t>
             </a:r>
-            <a:endParaRPr lang="en-US"/>
           </a:p>
         </p:txBody>
       </p:sp>
@@ -2430,38 +2407,37 @@
           <a:p>
             <a:pPr lvl="0"/>
             <a:r>
-              <a:rPr lang="en-US" smtClean="0"/>
+              <a:rPr lang="en-US"/>
               <a:t>Edit Master text styles</a:t>
             </a:r>
           </a:p>
           <a:p>
             <a:pPr lvl="1"/>
             <a:r>
-              <a:rPr lang="en-US" smtClean="0"/>
+              <a:rPr lang="en-US"/>
               <a:t>Second level</a:t>
             </a:r>
           </a:p>
           <a:p>
             <a:pPr lvl="2"/>
             <a:r>
-              <a:rPr lang="en-US" smtClean="0"/>
+              <a:rPr lang="en-US"/>
               <a:t>Third level</a:t>
             </a:r>
           </a:p>
           <a:p>
             <a:pPr lvl="3"/>
             <a:r>
-              <a:rPr lang="en-US" smtClean="0"/>
+              <a:rPr lang="en-US"/>
               <a:t>Fourth level</a:t>
             </a:r>
           </a:p>
           <a:p>
             <a:pPr lvl="4"/>
             <a:r>
-              <a:rPr lang="en-US" smtClean="0"/>
+              <a:rPr lang="en-US"/>
               <a:t>Fifth level</a:t>
             </a:r>
-            <a:endParaRPr lang="en-US"/>
           </a:p>
         </p:txBody>
       </p:sp>
@@ -2524,7 +2500,7 @@
           <a:p>
             <a:pPr lvl="0"/>
             <a:r>
-              <a:rPr lang="en-US" smtClean="0"/>
+              <a:rPr lang="en-US"/>
               <a:t>Edit Master text styles</a:t>
             </a:r>
           </a:p>
@@ -2547,7 +2523,7 @@
           <a:p>
             <a:fld id="{3FAB681F-8935-486B-A8D2-5DA5ACD50193}" type="datetimeFigureOut">
               <a:rPr lang="en-US" smtClean="0"/>
-              <a:t>11/27/2022</a:t>
+              <a:t>6/4/2023</a:t>
             </a:fld>
             <a:endParaRPr lang="en-US"/>
           </a:p>
@@ -2650,10 +2626,9 @@
           </a:lstStyle>
           <a:p>
             <a:r>
-              <a:rPr lang="en-US" smtClean="0"/>
+              <a:rPr lang="en-US"/>
               <a:t>Click to edit Master title style</a:t>
             </a:r>
-            <a:endParaRPr lang="en-US"/>
           </a:p>
         </p:txBody>
       </p:sp>
@@ -2777,7 +2752,7 @@
           <a:p>
             <a:pPr lvl="0"/>
             <a:r>
-              <a:rPr lang="en-US" smtClean="0"/>
+              <a:rPr lang="en-US"/>
               <a:t>Edit Master text styles</a:t>
             </a:r>
           </a:p>
@@ -2800,7 +2775,7 @@
           <a:p>
             <a:fld id="{3FAB681F-8935-486B-A8D2-5DA5ACD50193}" type="datetimeFigureOut">
               <a:rPr lang="en-US" smtClean="0"/>
-              <a:t>11/27/2022</a:t>
+              <a:t>6/4/2023</a:t>
             </a:fld>
             <a:endParaRPr lang="en-US"/>
           </a:p>
@@ -2909,10 +2884,9 @@
           <a:lstStyle/>
           <a:p>
             <a:r>
-              <a:rPr lang="en-US" smtClean="0"/>
+              <a:rPr lang="en-US"/>
               <a:t>Click to edit Master title style</a:t>
             </a:r>
-            <a:endParaRPr lang="en-US"/>
           </a:p>
         </p:txBody>
       </p:sp>
@@ -2943,38 +2917,37 @@
           <a:p>
             <a:pPr lvl="0"/>
             <a:r>
-              <a:rPr lang="en-US" smtClean="0"/>
+              <a:rPr lang="en-US"/>
               <a:t>Edit Master text styles</a:t>
             </a:r>
           </a:p>
           <a:p>
             <a:pPr lvl="1"/>
             <a:r>
-              <a:rPr lang="en-US" smtClean="0"/>
+              <a:rPr lang="en-US"/>
               <a:t>Second level</a:t>
             </a:r>
           </a:p>
           <a:p>
             <a:pPr lvl="2"/>
             <a:r>
-              <a:rPr lang="en-US" smtClean="0"/>
+              <a:rPr lang="en-US"/>
               <a:t>Third level</a:t>
             </a:r>
           </a:p>
           <a:p>
             <a:pPr lvl="3"/>
             <a:r>
-              <a:rPr lang="en-US" smtClean="0"/>
+              <a:rPr lang="en-US"/>
               <a:t>Fourth level</a:t>
             </a:r>
           </a:p>
           <a:p>
             <a:pPr lvl="4"/>
             <a:r>
-              <a:rPr lang="en-US" smtClean="0"/>
+              <a:rPr lang="en-US"/>
               <a:t>Fifth level</a:t>
             </a:r>
-            <a:endParaRPr lang="en-US"/>
           </a:p>
         </p:txBody>
       </p:sp>
@@ -3013,7 +2986,7 @@
           <a:p>
             <a:fld id="{3FAB681F-8935-486B-A8D2-5DA5ACD50193}" type="datetimeFigureOut">
               <a:rPr lang="en-US" smtClean="0"/>
-              <a:t>11/27/2022</a:t>
+              <a:t>6/4/2023</a:t>
             </a:fld>
             <a:endParaRPr lang="en-US"/>
           </a:p>
@@ -3434,10 +3407,9 @@
           <a:lstStyle/>
           <a:p>
             <a:r>
-              <a:rPr lang="en-US" dirty="0" smtClean="0"/>
+              <a:rPr lang="en-US" dirty="0"/>
               <a:t>About Me</a:t>
             </a:r>
-            <a:endParaRPr lang="en-US" dirty="0"/>
           </a:p>
         </p:txBody>
       </p:sp>
@@ -3451,14 +3423,14 @@
             <p:ph idx="1"/>
             <p:extLst>
               <p:ext uri="{D42A27DB-BD31-4B8C-83A1-F6EECF244321}">
-                <p14:modId xmlns:p14="http://schemas.microsoft.com/office/powerpoint/2010/main" val="3809759556"/>
+                <p14:modId xmlns:p14="http://schemas.microsoft.com/office/powerpoint/2010/main" val="1416748944"/>
               </p:ext>
             </p:extLst>
           </p:nvPr>
         </p:nvGraphicFramePr>
         <p:xfrm>
           <a:off x="838200" y="1825625"/>
-          <a:ext cx="10515600" cy="2865120"/>
+          <a:ext cx="10515600" cy="2123440"/>
         </p:xfrm>
         <a:graphic>
           <a:graphicData uri="http://schemas.openxmlformats.org/drawingml/2006/table">
@@ -3489,10 +3461,9 @@
                     <a:lstStyle/>
                     <a:p>
                       <a:r>
-                        <a:rPr lang="en-US" dirty="0" smtClean="0"/>
+                        <a:rPr lang="en-US" dirty="0"/>
                         <a:t>Name</a:t>
                       </a:r>
-                      <a:endParaRPr lang="en-US" dirty="0"/>
                     </a:p>
                   </a:txBody>
                   <a:tcPr/>
@@ -3503,11 +3474,11 @@
                     <a:lstStyle/>
                     <a:p>
                       <a:r>
-                        <a:rPr lang="en-US" dirty="0" smtClean="0"/>
+                        <a:rPr lang="en-US" dirty="0"/>
                         <a:t>Hasan Mahmud </a:t>
                       </a:r>
                       <a:r>
-                        <a:rPr lang="en-US" dirty="0" err="1" smtClean="0"/>
+                        <a:rPr lang="en-US" dirty="0" err="1"/>
                         <a:t>Rhidoy</a:t>
                       </a:r>
                       <a:endParaRPr lang="en-US" dirty="0"/>
@@ -3528,10 +3499,9 @@
                     <a:lstStyle/>
                     <a:p>
                       <a:r>
-                        <a:rPr lang="en-US" dirty="0" smtClean="0"/>
+                        <a:rPr lang="en-US" dirty="0"/>
                         <a:t>Profession</a:t>
                       </a:r>
-                      <a:endParaRPr lang="en-US" dirty="0"/>
                     </a:p>
                   </a:txBody>
                   <a:tcPr/>
@@ -3542,14 +3512,9 @@
                     <a:lstStyle/>
                     <a:p>
                       <a:r>
-                        <a:rPr lang="en-US" dirty="0" smtClean="0"/>
-                        <a:t>Software Development Engineer, BRAC</a:t>
+                        <a:rPr lang="en-US" dirty="0"/>
+                        <a:t>Sr. Software Development Engineer, RBTSB, Malaysia</a:t>
                       </a:r>
-                      <a:r>
-                        <a:rPr lang="en-US" baseline="0" dirty="0" smtClean="0"/>
-                        <a:t> IT</a:t>
-                      </a:r>
-                      <a:endParaRPr lang="en-US" dirty="0"/>
                     </a:p>
                   </a:txBody>
                   <a:tcPr/>
@@ -3567,10 +3532,9 @@
                     <a:lstStyle/>
                     <a:p>
                       <a:r>
-                        <a:rPr lang="en-US" dirty="0" smtClean="0"/>
+                        <a:rPr lang="en-US" dirty="0"/>
                         <a:t>Experience</a:t>
                       </a:r>
-                      <a:endParaRPr lang="en-US" dirty="0"/>
                     </a:p>
                   </a:txBody>
                   <a:tcPr/>
@@ -3585,8 +3549,8 @@
                         <a:buChar char="q"/>
                       </a:pPr>
                       <a:r>
-                        <a:rPr lang="en-US" dirty="0" smtClean="0"/>
-                        <a:t>Software Engineer – 3 years and 6 Months (Continuing)</a:t>
+                        <a:rPr lang="en-US" dirty="0"/>
+                        <a:t>Software Engineer – 4 years+ (Continuing)</a:t>
                       </a:r>
                     </a:p>
                     <a:p>
@@ -3595,10 +3559,9 @@
                         <a:buChar char="q"/>
                       </a:pPr>
                       <a:r>
-                        <a:rPr lang="en-US" dirty="0" smtClean="0"/>
-                        <a:t>Programming Instructor – 9 Months (Continuing)</a:t>
+                        <a:rPr lang="en-US" dirty="0"/>
+                        <a:t>Programming Instructor – 1 Year+ (Continuing)</a:t>
                       </a:r>
-                      <a:endParaRPr lang="en-US" dirty="0"/>
                     </a:p>
                   </a:txBody>
                   <a:tcPr/>
@@ -3616,10 +3579,9 @@
                     <a:lstStyle/>
                     <a:p>
                       <a:r>
-                        <a:rPr lang="en-US" dirty="0" smtClean="0"/>
-                        <a:t>Cell Number</a:t>
+                        <a:rPr lang="en-US" dirty="0"/>
+                        <a:t>LinkedIn</a:t>
                       </a:r>
-                      <a:endParaRPr lang="en-US" dirty="0"/>
                     </a:p>
                   </a:txBody>
                   <a:tcPr/>
@@ -3634,96 +3596,9 @@
                         <a:buNone/>
                       </a:pPr>
                       <a:r>
-                        <a:rPr lang="en-US" dirty="0" smtClean="0"/>
-                        <a:t>+8801516112348 [Emergency Only]</a:t>
-                      </a:r>
-                      <a:endParaRPr lang="en-US" dirty="0"/>
-                    </a:p>
-                  </a:txBody>
-                  <a:tcPr/>
-                </a:tc>
-                <a:extLst>
-                  <a:ext uri="{0D108BD9-81ED-4DB2-BD59-A6C34878D82A}">
-                    <a16:rowId xmlns:a16="http://schemas.microsoft.com/office/drawing/2014/main" val="2107279215"/>
-                  </a:ext>
-                </a:extLst>
-              </a:tr>
-              <a:tr h="370840">
-                <a:tc>
-                  <a:txBody>
-                    <a:bodyPr/>
-                    <a:lstStyle/>
-                    <a:p>
-                      <a:r>
-                        <a:rPr lang="en-US" dirty="0" smtClean="0"/>
-                        <a:t>WhatsApp</a:t>
-                      </a:r>
-                      <a:r>
-                        <a:rPr lang="en-US" baseline="0" dirty="0" smtClean="0"/>
-                        <a:t> </a:t>
-                      </a:r>
-                      <a:r>
-                        <a:rPr lang="en-US" dirty="0" smtClean="0"/>
-                        <a:t>Number</a:t>
-                      </a:r>
-                      <a:endParaRPr lang="en-US" dirty="0"/>
-                    </a:p>
-                  </a:txBody>
-                  <a:tcPr/>
-                </a:tc>
-                <a:tc>
-                  <a:txBody>
-                    <a:bodyPr/>
-                    <a:lstStyle/>
-                    <a:p>
-                      <a:pPr marL="0" indent="0">
-                        <a:buFont typeface="Wingdings" panose="05000000000000000000" pitchFamily="2" charset="2"/>
-                        <a:buNone/>
-                      </a:pPr>
-                      <a:r>
-                        <a:rPr lang="en-US" dirty="0" smtClean="0"/>
-                        <a:t>+8801516112348</a:t>
-                      </a:r>
-                      <a:endParaRPr lang="en-US" dirty="0"/>
-                    </a:p>
-                  </a:txBody>
-                  <a:tcPr/>
-                </a:tc>
-                <a:extLst>
-                  <a:ext uri="{0D108BD9-81ED-4DB2-BD59-A6C34878D82A}">
-                    <a16:rowId xmlns:a16="http://schemas.microsoft.com/office/drawing/2014/main" val="2174930838"/>
-                  </a:ext>
-                </a:extLst>
-              </a:tr>
-              <a:tr h="370840">
-                <a:tc>
-                  <a:txBody>
-                    <a:bodyPr/>
-                    <a:lstStyle/>
-                    <a:p>
-                      <a:r>
-                        <a:rPr lang="en-US" dirty="0" smtClean="0"/>
-                        <a:t>LinkedIn</a:t>
-                      </a:r>
-                      <a:endParaRPr lang="en-US" dirty="0"/>
-                    </a:p>
-                  </a:txBody>
-                  <a:tcPr/>
-                </a:tc>
-                <a:tc>
-                  <a:txBody>
-                    <a:bodyPr/>
-                    <a:lstStyle/>
-                    <a:p>
-                      <a:pPr marL="0" indent="0">
-                        <a:buFont typeface="Wingdings" panose="05000000000000000000" pitchFamily="2" charset="2"/>
-                        <a:buNone/>
-                      </a:pPr>
-                      <a:r>
-                        <a:rPr lang="en-US" dirty="0" smtClean="0"/>
+                        <a:rPr lang="en-US" dirty="0"/>
                         <a:t>https://www.linkedin.com/in/codemechanix/</a:t>
                       </a:r>
-                      <a:endParaRPr lang="en-US" dirty="0"/>
                     </a:p>
                   </a:txBody>
                   <a:tcPr/>
@@ -3741,10 +3616,9 @@
                     <a:lstStyle/>
                     <a:p>
                       <a:r>
-                        <a:rPr lang="en-US" dirty="0" smtClean="0"/>
+                        <a:rPr lang="en-US" dirty="0"/>
                         <a:t>GitHub</a:t>
                       </a:r>
-                      <a:endParaRPr lang="en-US" dirty="0"/>
                     </a:p>
                   </a:txBody>
                   <a:tcPr/>
@@ -3759,10 +3633,9 @@
                         <a:buNone/>
                       </a:pPr>
                       <a:r>
-                        <a:rPr lang="en-US" dirty="0" smtClean="0"/>
+                        <a:rPr lang="en-US" dirty="0"/>
                         <a:t>https://github.com/CodeMechanix</a:t>
                       </a:r>
-                      <a:endParaRPr lang="en-US" dirty="0"/>
                     </a:p>
                   </a:txBody>
                   <a:tcPr/>
@@ -3787,1872 +3660,6 @@
   <p:clrMapOvr>
     <a:masterClrMapping/>
   </p:clrMapOvr>
-  <p:timing>
-    <p:tnLst>
-      <p:par>
-        <p:cTn id="1" dur="indefinite" restart="never" nodeType="tmRoot"/>
-      </p:par>
-    </p:tnLst>
-  </p:timing>
-</p:sld>
-</file>
-
-<file path=ppt/slides/slide10.xml><?xml version="1.0" encoding="utf-8"?>
-<p:sld xmlns:a="http://schemas.openxmlformats.org/drawingml/2006/main" xmlns:r="http://schemas.openxmlformats.org/officeDocument/2006/relationships" xmlns:p="http://schemas.openxmlformats.org/presentationml/2006/main">
-  <p:cSld>
-    <p:spTree>
-      <p:nvGrpSpPr>
-        <p:cNvPr id="1" name=""/>
-        <p:cNvGrpSpPr/>
-        <p:nvPr/>
-      </p:nvGrpSpPr>
-      <p:grpSpPr>
-        <a:xfrm>
-          <a:off x="0" y="0"/>
-          <a:ext cx="0" cy="0"/>
-          <a:chOff x="0" y="0"/>
-          <a:chExt cx="0" cy="0"/>
-        </a:xfrm>
-      </p:grpSpPr>
-      <p:sp>
-        <p:nvSpPr>
-          <p:cNvPr id="2" name="Title 1"/>
-          <p:cNvSpPr>
-            <a:spLocks noGrp="1"/>
-          </p:cNvSpPr>
-          <p:nvPr>
-            <p:ph type="title"/>
-          </p:nvPr>
-        </p:nvSpPr>
-        <p:spPr/>
-        <p:txBody>
-          <a:bodyPr/>
-          <a:lstStyle/>
-          <a:p>
-            <a:pPr algn="ctr"/>
-            <a:r>
-              <a:rPr lang="as-IN" b="1" dirty="0" smtClean="0"/>
-              <a:t>কোর্সে যা কিছু আছে</a:t>
-            </a:r>
-            <a:endParaRPr lang="en-US" dirty="0"/>
-          </a:p>
-        </p:txBody>
-      </p:sp>
-      <p:graphicFrame>
-        <p:nvGraphicFramePr>
-          <p:cNvPr id="4" name="Content Placeholder 3"/>
-          <p:cNvGraphicFramePr>
-            <a:graphicFrameLocks noGrp="1"/>
-          </p:cNvGraphicFramePr>
-          <p:nvPr>
-            <p:ph idx="1"/>
-            <p:extLst>
-              <p:ext uri="{D42A27DB-BD31-4B8C-83A1-F6EECF244321}">
-                <p14:modId xmlns:p14="http://schemas.microsoft.com/office/powerpoint/2010/main" val="683192237"/>
-              </p:ext>
-            </p:extLst>
-          </p:nvPr>
-        </p:nvGraphicFramePr>
-        <p:xfrm>
-          <a:off x="838200" y="1825625"/>
-          <a:ext cx="10515600" cy="4023360"/>
-        </p:xfrm>
-        <a:graphic>
-          <a:graphicData uri="http://schemas.openxmlformats.org/drawingml/2006/table">
-            <a:tbl>
-              <a:tblPr firstRow="1" bandRow="1">
-                <a:tableStyleId>{8799B23B-EC83-4686-B30A-512413B5E67A}</a:tableStyleId>
-              </a:tblPr>
-              <a:tblGrid>
-                <a:gridCol w="2602584">
-                  <a:extLst>
-                    <a:ext uri="{9D8B030D-6E8A-4147-A177-3AD203B41FA5}">
-                      <a16:colId xmlns:a16="http://schemas.microsoft.com/office/drawing/2014/main" val="1829890483"/>
-                    </a:ext>
-                  </a:extLst>
-                </a:gridCol>
-                <a:gridCol w="7913016">
-                  <a:extLst>
-                    <a:ext uri="{9D8B030D-6E8A-4147-A177-3AD203B41FA5}">
-                      <a16:colId xmlns:a16="http://schemas.microsoft.com/office/drawing/2014/main" val="149053383"/>
-                    </a:ext>
-                  </a:extLst>
-                </a:gridCol>
-              </a:tblGrid>
-              <a:tr h="370840">
-                <a:tc>
-                  <a:txBody>
-                    <a:bodyPr/>
-                    <a:lstStyle/>
-                    <a:p>
-                      <a:r>
-                        <a:rPr lang="en-US" dirty="0" smtClean="0"/>
-                        <a:t>Class - 14</a:t>
-                      </a:r>
-                      <a:endParaRPr lang="en-US" dirty="0"/>
-                    </a:p>
-                  </a:txBody>
-                  <a:tcPr/>
-                </a:tc>
-                <a:tc>
-                  <a:txBody>
-                    <a:bodyPr/>
-                    <a:lstStyle/>
-                    <a:p>
-                      <a:pPr marL="285750" indent="-285750">
-                        <a:buFont typeface="Wingdings" panose="05000000000000000000" pitchFamily="2" charset="2"/>
-                        <a:buChar char="ü"/>
-                      </a:pPr>
-                      <a:r>
-                        <a:rPr lang="en-US" dirty="0" smtClean="0"/>
-                        <a:t>Function</a:t>
-                      </a:r>
-                    </a:p>
-                    <a:p>
-                      <a:pPr marL="285750" indent="-285750">
-                        <a:buFont typeface="Wingdings" panose="05000000000000000000" pitchFamily="2" charset="2"/>
-                        <a:buChar char="ü"/>
-                      </a:pPr>
-                      <a:r>
-                        <a:rPr lang="en-US" dirty="0" smtClean="0"/>
-                        <a:t>*</a:t>
-                      </a:r>
-                      <a:r>
-                        <a:rPr lang="en-US" dirty="0" err="1" smtClean="0"/>
-                        <a:t>args</a:t>
-                      </a:r>
-                      <a:r>
-                        <a:rPr lang="en-US" dirty="0" smtClean="0"/>
-                        <a:t> &amp;&amp; **</a:t>
-                      </a:r>
-                      <a:r>
-                        <a:rPr lang="en-US" dirty="0" err="1" smtClean="0"/>
-                        <a:t>kwargs</a:t>
-                      </a:r>
-                      <a:endParaRPr lang="en-US" dirty="0"/>
-                    </a:p>
-                  </a:txBody>
-                  <a:tcPr/>
-                </a:tc>
-                <a:extLst>
-                  <a:ext uri="{0D108BD9-81ED-4DB2-BD59-A6C34878D82A}">
-                    <a16:rowId xmlns:a16="http://schemas.microsoft.com/office/drawing/2014/main" val="735848637"/>
-                  </a:ext>
-                </a:extLst>
-              </a:tr>
-              <a:tr h="370840">
-                <a:tc>
-                  <a:txBody>
-                    <a:bodyPr/>
-                    <a:lstStyle/>
-                    <a:p>
-                      <a:r>
-                        <a:rPr lang="en-US" dirty="0" smtClean="0"/>
-                        <a:t>Class – 15</a:t>
-                      </a:r>
-                      <a:endParaRPr lang="en-US" dirty="0"/>
-                    </a:p>
-                  </a:txBody>
-                  <a:tcPr/>
-                </a:tc>
-                <a:tc>
-                  <a:txBody>
-                    <a:bodyPr/>
-                    <a:lstStyle/>
-                    <a:p>
-                      <a:pPr marL="285750" indent="-285750">
-                        <a:buFont typeface="Wingdings" panose="05000000000000000000" pitchFamily="2" charset="2"/>
-                        <a:buChar char="ü"/>
-                      </a:pPr>
-                      <a:r>
-                        <a:rPr lang="en-US" dirty="0" smtClean="0"/>
-                        <a:t>Lambda, map, filter</a:t>
-                      </a:r>
-                    </a:p>
-                    <a:p>
-                      <a:pPr marL="285750" indent="-285750">
-                        <a:buFont typeface="Wingdings" panose="05000000000000000000" pitchFamily="2" charset="2"/>
-                        <a:buChar char="ü"/>
-                      </a:pPr>
-                      <a:r>
-                        <a:rPr lang="en-US" dirty="0" smtClean="0"/>
-                        <a:t>Comprehension [List, Dictionary, and Set]</a:t>
-                      </a:r>
-                      <a:endParaRPr lang="en-US" dirty="0"/>
-                    </a:p>
-                  </a:txBody>
-                  <a:tcPr/>
-                </a:tc>
-                <a:extLst>
-                  <a:ext uri="{0D108BD9-81ED-4DB2-BD59-A6C34878D82A}">
-                    <a16:rowId xmlns:a16="http://schemas.microsoft.com/office/drawing/2014/main" val="1986023974"/>
-                  </a:ext>
-                </a:extLst>
-              </a:tr>
-              <a:tr h="370840">
-                <a:tc>
-                  <a:txBody>
-                    <a:bodyPr/>
-                    <a:lstStyle/>
-                    <a:p>
-                      <a:r>
-                        <a:rPr lang="en-US" dirty="0" smtClean="0"/>
-                        <a:t>Class – 16</a:t>
-                      </a:r>
-                      <a:endParaRPr lang="en-US" dirty="0"/>
-                    </a:p>
-                  </a:txBody>
-                  <a:tcPr/>
-                </a:tc>
-                <a:tc>
-                  <a:txBody>
-                    <a:bodyPr/>
-                    <a:lstStyle/>
-                    <a:p>
-                      <a:pPr marL="285750" indent="-285750">
-                        <a:buFont typeface="Wingdings" panose="05000000000000000000" pitchFamily="2" charset="2"/>
-                        <a:buChar char="ü"/>
-                      </a:pPr>
-                      <a:r>
-                        <a:rPr lang="en-US" dirty="0" smtClean="0"/>
-                        <a:t>Python Scope</a:t>
-                      </a:r>
-                    </a:p>
-                    <a:p>
-                      <a:pPr marL="285750" indent="-285750">
-                        <a:buFont typeface="Wingdings" panose="05000000000000000000" pitchFamily="2" charset="2"/>
-                        <a:buChar char="ü"/>
-                      </a:pPr>
-                      <a:r>
-                        <a:rPr lang="en-US" dirty="0" smtClean="0"/>
-                        <a:t>Python </a:t>
-                      </a:r>
-                      <a:r>
-                        <a:rPr lang="en-US" dirty="0" err="1" smtClean="0"/>
-                        <a:t>Datetime</a:t>
-                      </a:r>
-                      <a:r>
-                        <a:rPr lang="en-US" dirty="0" smtClean="0"/>
-                        <a:t>/Date</a:t>
-                      </a:r>
-                    </a:p>
-                    <a:p>
-                      <a:pPr marL="285750" indent="-285750">
-                        <a:buFont typeface="Wingdings" panose="05000000000000000000" pitchFamily="2" charset="2"/>
-                        <a:buChar char="ü"/>
-                      </a:pPr>
-                      <a:r>
-                        <a:rPr lang="en-US" dirty="0" smtClean="0"/>
-                        <a:t>Python Math</a:t>
-                      </a:r>
-                    </a:p>
-                    <a:p>
-                      <a:pPr marL="285750" indent="-285750">
-                        <a:buFont typeface="Wingdings" panose="05000000000000000000" pitchFamily="2" charset="2"/>
-                        <a:buChar char="ü"/>
-                      </a:pPr>
-                      <a:r>
-                        <a:rPr lang="en-US" dirty="0" smtClean="0"/>
-                        <a:t>Python JSON</a:t>
-                      </a:r>
-                      <a:endParaRPr lang="en-US" dirty="0"/>
-                    </a:p>
-                  </a:txBody>
-                  <a:tcPr/>
-                </a:tc>
-                <a:extLst>
-                  <a:ext uri="{0D108BD9-81ED-4DB2-BD59-A6C34878D82A}">
-                    <a16:rowId xmlns:a16="http://schemas.microsoft.com/office/drawing/2014/main" val="2281747686"/>
-                  </a:ext>
-                </a:extLst>
-              </a:tr>
-              <a:tr h="370840">
-                <a:tc>
-                  <a:txBody>
-                    <a:bodyPr/>
-                    <a:lstStyle/>
-                    <a:p>
-                      <a:r>
-                        <a:rPr lang="en-US" dirty="0" smtClean="0"/>
-                        <a:t>Class – 17</a:t>
-                      </a:r>
-                      <a:endParaRPr lang="en-US" dirty="0"/>
-                    </a:p>
-                  </a:txBody>
-                  <a:tcPr/>
-                </a:tc>
-                <a:tc>
-                  <a:txBody>
-                    <a:bodyPr/>
-                    <a:lstStyle/>
-                    <a:p>
-                      <a:pPr marL="285750" indent="-285750">
-                        <a:buFont typeface="Wingdings" panose="05000000000000000000" pitchFamily="2" charset="2"/>
-                        <a:buChar char="ü"/>
-                      </a:pPr>
-                      <a:r>
-                        <a:rPr lang="en-US" dirty="0" smtClean="0"/>
-                        <a:t>Modules</a:t>
-                      </a:r>
-                    </a:p>
-                    <a:p>
-                      <a:pPr marL="285750" indent="-285750">
-                        <a:buFont typeface="Wingdings" panose="05000000000000000000" pitchFamily="2" charset="2"/>
-                        <a:buChar char="ü"/>
-                      </a:pPr>
-                      <a:r>
-                        <a:rPr lang="en-US" dirty="0" smtClean="0"/>
-                        <a:t>Packages</a:t>
-                      </a:r>
-                      <a:endParaRPr lang="en-US" dirty="0"/>
-                    </a:p>
-                  </a:txBody>
-                  <a:tcPr/>
-                </a:tc>
-                <a:extLst>
-                  <a:ext uri="{0D108BD9-81ED-4DB2-BD59-A6C34878D82A}">
-                    <a16:rowId xmlns:a16="http://schemas.microsoft.com/office/drawing/2014/main" val="416766908"/>
-                  </a:ext>
-                </a:extLst>
-              </a:tr>
-              <a:tr h="370840">
-                <a:tc>
-                  <a:txBody>
-                    <a:bodyPr/>
-                    <a:lstStyle/>
-                    <a:p>
-                      <a:r>
-                        <a:rPr lang="en-US" dirty="0" smtClean="0"/>
-                        <a:t>Class – 18</a:t>
-                      </a:r>
-                      <a:endParaRPr lang="en-US" dirty="0"/>
-                    </a:p>
-                  </a:txBody>
-                  <a:tcPr/>
-                </a:tc>
-                <a:tc>
-                  <a:txBody>
-                    <a:bodyPr/>
-                    <a:lstStyle/>
-                    <a:p>
-                      <a:pPr marL="285750" indent="-285750">
-                        <a:buFont typeface="Wingdings" panose="05000000000000000000" pitchFamily="2" charset="2"/>
-                        <a:buChar char="ü"/>
-                      </a:pPr>
-                      <a:r>
-                        <a:rPr lang="en-US" dirty="0" smtClean="0"/>
-                        <a:t>Iterator</a:t>
-                      </a:r>
-                    </a:p>
-                    <a:p>
-                      <a:pPr marL="285750" indent="-285750">
-                        <a:buFont typeface="Wingdings" panose="05000000000000000000" pitchFamily="2" charset="2"/>
-                        <a:buChar char="ü"/>
-                      </a:pPr>
-                      <a:r>
-                        <a:rPr lang="en-US" dirty="0" smtClean="0"/>
-                        <a:t>yield</a:t>
-                      </a:r>
-                    </a:p>
-                    <a:p>
-                      <a:pPr marL="285750" indent="-285750">
-                        <a:buFont typeface="Wingdings" panose="05000000000000000000" pitchFamily="2" charset="2"/>
-                        <a:buChar char="ü"/>
-                      </a:pPr>
-                      <a:r>
-                        <a:rPr lang="en-US" dirty="0" smtClean="0"/>
-                        <a:t>and Generator</a:t>
-                      </a:r>
-                      <a:endParaRPr lang="en-US" dirty="0"/>
-                    </a:p>
-                  </a:txBody>
-                  <a:tcPr/>
-                </a:tc>
-                <a:extLst>
-                  <a:ext uri="{0D108BD9-81ED-4DB2-BD59-A6C34878D82A}">
-                    <a16:rowId xmlns:a16="http://schemas.microsoft.com/office/drawing/2014/main" val="1002792661"/>
-                  </a:ext>
-                </a:extLst>
-              </a:tr>
-            </a:tbl>
-          </a:graphicData>
-        </a:graphic>
-      </p:graphicFrame>
-    </p:spTree>
-    <p:extLst>
-      <p:ext uri="{BB962C8B-B14F-4D97-AF65-F5344CB8AC3E}">
-        <p14:creationId xmlns:p14="http://schemas.microsoft.com/office/powerpoint/2010/main" val="220950870"/>
-      </p:ext>
-    </p:extLst>
-  </p:cSld>
-  <p:clrMapOvr>
-    <a:masterClrMapping/>
-  </p:clrMapOvr>
-  <p:timing>
-    <p:tnLst>
-      <p:par>
-        <p:cTn id="1" dur="indefinite" restart="never" nodeType="tmRoot"/>
-      </p:par>
-    </p:tnLst>
-  </p:timing>
-</p:sld>
-</file>
-
-<file path=ppt/slides/slide11.xml><?xml version="1.0" encoding="utf-8"?>
-<p:sld xmlns:a="http://schemas.openxmlformats.org/drawingml/2006/main" xmlns:r="http://schemas.openxmlformats.org/officeDocument/2006/relationships" xmlns:p="http://schemas.openxmlformats.org/presentationml/2006/main">
-  <p:cSld>
-    <p:spTree>
-      <p:nvGrpSpPr>
-        <p:cNvPr id="1" name=""/>
-        <p:cNvGrpSpPr/>
-        <p:nvPr/>
-      </p:nvGrpSpPr>
-      <p:grpSpPr>
-        <a:xfrm>
-          <a:off x="0" y="0"/>
-          <a:ext cx="0" cy="0"/>
-          <a:chOff x="0" y="0"/>
-          <a:chExt cx="0" cy="0"/>
-        </a:xfrm>
-      </p:grpSpPr>
-      <p:sp>
-        <p:nvSpPr>
-          <p:cNvPr id="2" name="Title 1"/>
-          <p:cNvSpPr>
-            <a:spLocks noGrp="1"/>
-          </p:cNvSpPr>
-          <p:nvPr>
-            <p:ph type="title"/>
-          </p:nvPr>
-        </p:nvSpPr>
-        <p:spPr/>
-        <p:txBody>
-          <a:bodyPr/>
-          <a:lstStyle/>
-          <a:p>
-            <a:pPr algn="ctr"/>
-            <a:r>
-              <a:rPr lang="as-IN" b="1" dirty="0" smtClean="0"/>
-              <a:t>কোর্সে যা কিছু আছে</a:t>
-            </a:r>
-            <a:endParaRPr lang="en-US" dirty="0"/>
-          </a:p>
-        </p:txBody>
-      </p:sp>
-      <p:graphicFrame>
-        <p:nvGraphicFramePr>
-          <p:cNvPr id="5" name="Content Placeholder 4"/>
-          <p:cNvGraphicFramePr>
-            <a:graphicFrameLocks noGrp="1"/>
-          </p:cNvGraphicFramePr>
-          <p:nvPr>
-            <p:ph idx="1"/>
-            <p:extLst>
-              <p:ext uri="{D42A27DB-BD31-4B8C-83A1-F6EECF244321}">
-                <p14:modId xmlns:p14="http://schemas.microsoft.com/office/powerpoint/2010/main" val="1872484663"/>
-              </p:ext>
-            </p:extLst>
-          </p:nvPr>
-        </p:nvGraphicFramePr>
-        <p:xfrm>
-          <a:off x="838200" y="1825625"/>
-          <a:ext cx="10515600" cy="4028440"/>
-        </p:xfrm>
-        <a:graphic>
-          <a:graphicData uri="http://schemas.openxmlformats.org/drawingml/2006/table">
-            <a:tbl>
-              <a:tblPr firstRow="1" bandRow="1">
-                <a:tableStyleId>{0505E3EF-67EA-436B-97B2-0124C06EBD24}</a:tableStyleId>
-              </a:tblPr>
-              <a:tblGrid>
-                <a:gridCol w="2715705">
-                  <a:extLst>
-                    <a:ext uri="{9D8B030D-6E8A-4147-A177-3AD203B41FA5}">
-                      <a16:colId xmlns:a16="http://schemas.microsoft.com/office/drawing/2014/main" val="855789850"/>
-                    </a:ext>
-                  </a:extLst>
-                </a:gridCol>
-                <a:gridCol w="7799895">
-                  <a:extLst>
-                    <a:ext uri="{9D8B030D-6E8A-4147-A177-3AD203B41FA5}">
-                      <a16:colId xmlns:a16="http://schemas.microsoft.com/office/drawing/2014/main" val="1694611677"/>
-                    </a:ext>
-                  </a:extLst>
-                </a:gridCol>
-              </a:tblGrid>
-              <a:tr h="370840">
-                <a:tc>
-                  <a:txBody>
-                    <a:bodyPr/>
-                    <a:lstStyle/>
-                    <a:p>
-                      <a:r>
-                        <a:rPr lang="en-US" dirty="0" smtClean="0"/>
-                        <a:t>Class – 19</a:t>
-                      </a:r>
-                      <a:endParaRPr lang="en-US" dirty="0"/>
-                    </a:p>
-                  </a:txBody>
-                  <a:tcPr/>
-                </a:tc>
-                <a:tc>
-                  <a:txBody>
-                    <a:bodyPr/>
-                    <a:lstStyle/>
-                    <a:p>
-                      <a:pPr marL="285750" indent="-285750">
-                        <a:buFont typeface="Wingdings" panose="05000000000000000000" pitchFamily="2" charset="2"/>
-                        <a:buChar char="ü"/>
-                      </a:pPr>
-                      <a:r>
-                        <a:rPr lang="en-US" sz="1800" b="0" i="0" kern="1200" dirty="0" smtClean="0">
-                          <a:solidFill>
-                            <a:schemeClr val="dk1"/>
-                          </a:solidFill>
-                          <a:effectLst/>
-                          <a:latin typeface="+mn-lt"/>
-                          <a:ea typeface="+mn-ea"/>
-                          <a:cs typeface="+mn-cs"/>
-                        </a:rPr>
-                        <a:t>Regular Expression</a:t>
-                      </a:r>
-                    </a:p>
-                    <a:p>
-                      <a:pPr marL="285750" indent="-285750">
-                        <a:buFont typeface="Wingdings" panose="05000000000000000000" pitchFamily="2" charset="2"/>
-                        <a:buChar char="ü"/>
-                      </a:pPr>
-                      <a:r>
-                        <a:rPr lang="en-US" sz="1800" b="0" i="0" kern="1200" dirty="0" smtClean="0">
-                          <a:solidFill>
-                            <a:schemeClr val="dk1"/>
-                          </a:solidFill>
-                          <a:effectLst/>
-                          <a:latin typeface="+mn-lt"/>
-                          <a:ea typeface="+mn-ea"/>
-                          <a:cs typeface="+mn-cs"/>
-                        </a:rPr>
-                        <a:t>Magic Method</a:t>
-                      </a:r>
-                    </a:p>
-                  </a:txBody>
-                  <a:tcPr/>
-                </a:tc>
-                <a:extLst>
-                  <a:ext uri="{0D108BD9-81ED-4DB2-BD59-A6C34878D82A}">
-                    <a16:rowId xmlns:a16="http://schemas.microsoft.com/office/drawing/2014/main" val="1178221286"/>
-                  </a:ext>
-                </a:extLst>
-              </a:tr>
-              <a:tr h="370840">
-                <a:tc>
-                  <a:txBody>
-                    <a:bodyPr/>
-                    <a:lstStyle/>
-                    <a:p>
-                      <a:r>
-                        <a:rPr lang="en-US" dirty="0" smtClean="0"/>
-                        <a:t>Class – 20</a:t>
-                      </a:r>
-                      <a:endParaRPr lang="en-US" dirty="0"/>
-                    </a:p>
-                  </a:txBody>
-                  <a:tcPr/>
-                </a:tc>
-                <a:tc>
-                  <a:txBody>
-                    <a:bodyPr/>
-                    <a:lstStyle/>
-                    <a:p>
-                      <a:pPr marL="285750" indent="-285750">
-                        <a:buFont typeface="Wingdings" panose="05000000000000000000" pitchFamily="2" charset="2"/>
-                        <a:buChar char="ü"/>
-                      </a:pPr>
-                      <a:r>
-                        <a:rPr lang="en-US" sz="1800" b="0" i="0" kern="1200" dirty="0" smtClean="0">
-                          <a:solidFill>
-                            <a:schemeClr val="dk1"/>
-                          </a:solidFill>
-                          <a:effectLst/>
-                          <a:latin typeface="+mn-lt"/>
-                          <a:ea typeface="+mn-ea"/>
-                          <a:cs typeface="+mn-cs"/>
-                        </a:rPr>
-                        <a:t>File</a:t>
-                      </a:r>
-                    </a:p>
-                    <a:p>
-                      <a:pPr marL="285750" indent="-285750">
-                        <a:buFont typeface="Wingdings" panose="05000000000000000000" pitchFamily="2" charset="2"/>
-                        <a:buChar char="ü"/>
-                      </a:pPr>
-                      <a:r>
-                        <a:rPr lang="en-US" sz="1800" b="0" i="0" kern="1200" dirty="0" smtClean="0">
-                          <a:solidFill>
-                            <a:schemeClr val="dk1"/>
-                          </a:solidFill>
-                          <a:effectLst/>
-                          <a:latin typeface="+mn-lt"/>
-                          <a:ea typeface="+mn-ea"/>
-                          <a:cs typeface="+mn-cs"/>
-                        </a:rPr>
-                        <a:t>Error Handling</a:t>
-                      </a:r>
-                    </a:p>
-                  </a:txBody>
-                  <a:tcPr/>
-                </a:tc>
-                <a:extLst>
-                  <a:ext uri="{0D108BD9-81ED-4DB2-BD59-A6C34878D82A}">
-                    <a16:rowId xmlns:a16="http://schemas.microsoft.com/office/drawing/2014/main" val="876129880"/>
-                  </a:ext>
-                </a:extLst>
-              </a:tr>
-              <a:tr h="370840">
-                <a:tc>
-                  <a:txBody>
-                    <a:bodyPr/>
-                    <a:lstStyle/>
-                    <a:p>
-                      <a:r>
-                        <a:rPr lang="en-US" dirty="0" smtClean="0"/>
-                        <a:t>Class – 21</a:t>
-                      </a:r>
-                      <a:endParaRPr lang="en-US" dirty="0"/>
-                    </a:p>
-                  </a:txBody>
-                  <a:tcPr/>
-                </a:tc>
-                <a:tc>
-                  <a:txBody>
-                    <a:bodyPr/>
-                    <a:lstStyle/>
-                    <a:p>
-                      <a:pPr marL="285750" indent="-285750">
-                        <a:buFont typeface="Wingdings" panose="05000000000000000000" pitchFamily="2" charset="2"/>
-                        <a:buChar char="ü"/>
-                      </a:pPr>
-                      <a:r>
-                        <a:rPr lang="en-US" sz="1800" b="0" i="0" kern="1200" dirty="0" smtClean="0">
-                          <a:solidFill>
-                            <a:schemeClr val="dk1"/>
-                          </a:solidFill>
-                          <a:effectLst/>
-                          <a:latin typeface="+mn-lt"/>
-                          <a:ea typeface="+mn-ea"/>
-                          <a:cs typeface="+mn-cs"/>
-                        </a:rPr>
-                        <a:t>Recursion</a:t>
-                      </a:r>
-                    </a:p>
-                  </a:txBody>
-                  <a:tcPr/>
-                </a:tc>
-                <a:extLst>
-                  <a:ext uri="{0D108BD9-81ED-4DB2-BD59-A6C34878D82A}">
-                    <a16:rowId xmlns:a16="http://schemas.microsoft.com/office/drawing/2014/main" val="1820394889"/>
-                  </a:ext>
-                </a:extLst>
-              </a:tr>
-              <a:tr h="370840">
-                <a:tc>
-                  <a:txBody>
-                    <a:bodyPr/>
-                    <a:lstStyle/>
-                    <a:p>
-                      <a:r>
-                        <a:rPr lang="en-US" dirty="0" smtClean="0"/>
-                        <a:t>Class – 22</a:t>
-                      </a:r>
-                      <a:endParaRPr lang="en-US" dirty="0"/>
-                    </a:p>
-                  </a:txBody>
-                  <a:tcPr/>
-                </a:tc>
-                <a:tc>
-                  <a:txBody>
-                    <a:bodyPr/>
-                    <a:lstStyle/>
-                    <a:p>
-                      <a:pPr marL="285750" indent="-285750">
-                        <a:buFont typeface="Wingdings" panose="05000000000000000000" pitchFamily="2" charset="2"/>
-                        <a:buChar char="ü"/>
-                      </a:pPr>
-                      <a:r>
-                        <a:rPr lang="en-US" sz="1800" b="0" i="0" kern="1200" dirty="0" smtClean="0">
-                          <a:solidFill>
-                            <a:schemeClr val="dk1"/>
-                          </a:solidFill>
-                          <a:effectLst/>
-                          <a:latin typeface="+mn-lt"/>
-                          <a:ea typeface="+mn-ea"/>
-                          <a:cs typeface="+mn-cs"/>
-                        </a:rPr>
-                        <a:t>Basic OOP</a:t>
-                      </a:r>
-                    </a:p>
-                    <a:p>
-                      <a:pPr marL="285750" indent="-285750">
-                        <a:buFont typeface="Wingdings" panose="05000000000000000000" pitchFamily="2" charset="2"/>
-                        <a:buChar char="ü"/>
-                      </a:pPr>
-                      <a:r>
-                        <a:rPr lang="en-US" sz="1800" b="0" i="0" kern="1200" dirty="0" smtClean="0">
-                          <a:solidFill>
-                            <a:schemeClr val="dk1"/>
-                          </a:solidFill>
-                          <a:effectLst/>
-                          <a:latin typeface="+mn-lt"/>
-                          <a:ea typeface="+mn-ea"/>
-                          <a:cs typeface="+mn-cs"/>
-                        </a:rPr>
-                        <a:t>Class</a:t>
-                      </a:r>
-                    </a:p>
-                    <a:p>
-                      <a:pPr marL="285750" indent="-285750">
-                        <a:buFont typeface="Wingdings" panose="05000000000000000000" pitchFamily="2" charset="2"/>
-                        <a:buChar char="ü"/>
-                      </a:pPr>
-                      <a:r>
-                        <a:rPr lang="en-US" sz="1800" b="0" i="0" kern="1200" dirty="0" smtClean="0">
-                          <a:solidFill>
-                            <a:schemeClr val="dk1"/>
-                          </a:solidFill>
-                          <a:effectLst/>
-                          <a:latin typeface="+mn-lt"/>
-                          <a:ea typeface="+mn-ea"/>
-                          <a:cs typeface="+mn-cs"/>
-                        </a:rPr>
-                        <a:t>Object</a:t>
-                      </a:r>
-                    </a:p>
-                    <a:p>
-                      <a:pPr marL="285750" indent="-285750">
-                        <a:buFont typeface="Wingdings" panose="05000000000000000000" pitchFamily="2" charset="2"/>
-                        <a:buChar char="ü"/>
-                      </a:pPr>
-                      <a:r>
-                        <a:rPr lang="en-US" sz="1800" b="0" i="0" kern="1200" dirty="0" smtClean="0">
-                          <a:solidFill>
-                            <a:schemeClr val="dk1"/>
-                          </a:solidFill>
-                          <a:effectLst/>
-                          <a:latin typeface="+mn-lt"/>
-                          <a:ea typeface="+mn-ea"/>
-                          <a:cs typeface="+mn-cs"/>
-                        </a:rPr>
-                        <a:t>Constructor</a:t>
-                      </a:r>
-                    </a:p>
-                    <a:p>
-                      <a:pPr marL="285750" indent="-285750">
-                        <a:buFont typeface="Wingdings" panose="05000000000000000000" pitchFamily="2" charset="2"/>
-                        <a:buChar char="ü"/>
-                      </a:pPr>
-                      <a:r>
-                        <a:rPr lang="en-US" sz="1800" b="0" i="0" kern="1200" dirty="0" smtClean="0">
-                          <a:solidFill>
-                            <a:schemeClr val="dk1"/>
-                          </a:solidFill>
-                          <a:effectLst/>
-                          <a:latin typeface="+mn-lt"/>
-                          <a:ea typeface="+mn-ea"/>
-                          <a:cs typeface="+mn-cs"/>
-                        </a:rPr>
-                        <a:t>Destructor</a:t>
-                      </a:r>
-                    </a:p>
-                    <a:p>
-                      <a:pPr marL="285750" indent="-285750">
-                        <a:buFont typeface="Wingdings" panose="05000000000000000000" pitchFamily="2" charset="2"/>
-                        <a:buChar char="ü"/>
-                      </a:pPr>
-                      <a:r>
-                        <a:rPr lang="en-US" sz="1800" b="0" i="0" kern="1200" dirty="0" smtClean="0">
-                          <a:solidFill>
-                            <a:schemeClr val="dk1"/>
-                          </a:solidFill>
-                          <a:effectLst/>
-                          <a:latin typeface="+mn-lt"/>
-                          <a:ea typeface="+mn-ea"/>
-                          <a:cs typeface="+mn-cs"/>
-                        </a:rPr>
-                        <a:t>Self</a:t>
-                      </a:r>
-                    </a:p>
-                  </a:txBody>
-                  <a:tcPr/>
-                </a:tc>
-                <a:extLst>
-                  <a:ext uri="{0D108BD9-81ED-4DB2-BD59-A6C34878D82A}">
-                    <a16:rowId xmlns:a16="http://schemas.microsoft.com/office/drawing/2014/main" val="4011458694"/>
-                  </a:ext>
-                </a:extLst>
-              </a:tr>
-              <a:tr h="370840">
-                <a:tc>
-                  <a:txBody>
-                    <a:bodyPr/>
-                    <a:lstStyle/>
-                    <a:p>
-                      <a:r>
-                        <a:rPr lang="en-US" dirty="0" smtClean="0"/>
-                        <a:t>Class – 23</a:t>
-                      </a:r>
-                    </a:p>
-                    <a:p>
-                      <a:endParaRPr lang="en-US" dirty="0"/>
-                    </a:p>
-                  </a:txBody>
-                  <a:tcPr/>
-                </a:tc>
-                <a:tc>
-                  <a:txBody>
-                    <a:bodyPr/>
-                    <a:lstStyle/>
-                    <a:p>
-                      <a:pPr marL="285750" indent="-285750">
-                        <a:buFont typeface="Wingdings" panose="05000000000000000000" pitchFamily="2" charset="2"/>
-                        <a:buChar char="ü"/>
-                      </a:pPr>
-                      <a:r>
-                        <a:rPr lang="en-US" sz="1800" b="0" i="0" kern="1200" dirty="0" smtClean="0">
-                          <a:solidFill>
-                            <a:schemeClr val="dk1"/>
-                          </a:solidFill>
-                          <a:effectLst/>
-                          <a:latin typeface="+mn-lt"/>
-                          <a:ea typeface="+mn-ea"/>
-                          <a:cs typeface="+mn-cs"/>
-                        </a:rPr>
-                        <a:t>Inheritance</a:t>
-                      </a:r>
-                    </a:p>
-                    <a:p>
-                      <a:pPr marL="285750" marR="0" lvl="0" indent="-285750" algn="l" defTabSz="914400" rtl="0" eaLnBrk="1" fontAlgn="auto" latinLnBrk="0" hangingPunct="1">
-                        <a:lnSpc>
-                          <a:spcPct val="100000"/>
-                        </a:lnSpc>
-                        <a:spcBef>
-                          <a:spcPts val="0"/>
-                        </a:spcBef>
-                        <a:spcAft>
-                          <a:spcPts val="0"/>
-                        </a:spcAft>
-                        <a:buClrTx/>
-                        <a:buSzTx/>
-                        <a:buFont typeface="Wingdings" panose="05000000000000000000" pitchFamily="2" charset="2"/>
-                        <a:buChar char="ü"/>
-                        <a:tabLst/>
-                        <a:defRPr/>
-                      </a:pPr>
-                      <a:r>
-                        <a:rPr lang="en-US" sz="1800" b="0" i="0" kern="1200" dirty="0" smtClean="0">
-                          <a:solidFill>
-                            <a:schemeClr val="dk1"/>
-                          </a:solidFill>
-                          <a:effectLst/>
-                          <a:latin typeface="+mn-lt"/>
-                          <a:ea typeface="+mn-ea"/>
-                          <a:cs typeface="+mn-cs"/>
-                        </a:rPr>
-                        <a:t>Polymorphism</a:t>
-                      </a:r>
-                    </a:p>
-                  </a:txBody>
-                  <a:tcPr/>
-                </a:tc>
-                <a:extLst>
-                  <a:ext uri="{0D108BD9-81ED-4DB2-BD59-A6C34878D82A}">
-                    <a16:rowId xmlns:a16="http://schemas.microsoft.com/office/drawing/2014/main" val="2655640054"/>
-                  </a:ext>
-                </a:extLst>
-              </a:tr>
-            </a:tbl>
-          </a:graphicData>
-        </a:graphic>
-      </p:graphicFrame>
-    </p:spTree>
-    <p:extLst>
-      <p:ext uri="{BB962C8B-B14F-4D97-AF65-F5344CB8AC3E}">
-        <p14:creationId xmlns:p14="http://schemas.microsoft.com/office/powerpoint/2010/main" val="659238539"/>
-      </p:ext>
-    </p:extLst>
-  </p:cSld>
-  <p:clrMapOvr>
-    <a:masterClrMapping/>
-  </p:clrMapOvr>
-  <p:timing>
-    <p:tnLst>
-      <p:par>
-        <p:cTn id="1" dur="indefinite" restart="never" nodeType="tmRoot"/>
-      </p:par>
-    </p:tnLst>
-  </p:timing>
-</p:sld>
-</file>
-
-<file path=ppt/slides/slide12.xml><?xml version="1.0" encoding="utf-8"?>
-<p:sld xmlns:a="http://schemas.openxmlformats.org/drawingml/2006/main" xmlns:r="http://schemas.openxmlformats.org/officeDocument/2006/relationships" xmlns:p="http://schemas.openxmlformats.org/presentationml/2006/main">
-  <p:cSld>
-    <p:spTree>
-      <p:nvGrpSpPr>
-        <p:cNvPr id="1" name=""/>
-        <p:cNvGrpSpPr/>
-        <p:nvPr/>
-      </p:nvGrpSpPr>
-      <p:grpSpPr>
-        <a:xfrm>
-          <a:off x="0" y="0"/>
-          <a:ext cx="0" cy="0"/>
-          <a:chOff x="0" y="0"/>
-          <a:chExt cx="0" cy="0"/>
-        </a:xfrm>
-      </p:grpSpPr>
-      <p:sp>
-        <p:nvSpPr>
-          <p:cNvPr id="2" name="Title 1"/>
-          <p:cNvSpPr>
-            <a:spLocks noGrp="1"/>
-          </p:cNvSpPr>
-          <p:nvPr>
-            <p:ph type="title"/>
-          </p:nvPr>
-        </p:nvSpPr>
-        <p:spPr>
-          <a:xfrm>
-            <a:off x="838200" y="365125"/>
-            <a:ext cx="10515600" cy="832079"/>
-          </a:xfrm>
-        </p:spPr>
-        <p:txBody>
-          <a:bodyPr/>
-          <a:lstStyle/>
-          <a:p>
-            <a:pPr algn="ctr"/>
-            <a:r>
-              <a:rPr lang="as-IN" b="1" dirty="0" smtClean="0"/>
-              <a:t>কোর্সে যা কিছু আছে</a:t>
-            </a:r>
-            <a:endParaRPr lang="en-US" dirty="0"/>
-          </a:p>
-        </p:txBody>
-      </p:sp>
-      <p:graphicFrame>
-        <p:nvGraphicFramePr>
-          <p:cNvPr id="4" name="Content Placeholder 3"/>
-          <p:cNvGraphicFramePr>
-            <a:graphicFrameLocks noGrp="1"/>
-          </p:cNvGraphicFramePr>
-          <p:nvPr>
-            <p:ph idx="1"/>
-            <p:extLst>
-              <p:ext uri="{D42A27DB-BD31-4B8C-83A1-F6EECF244321}">
-                <p14:modId xmlns:p14="http://schemas.microsoft.com/office/powerpoint/2010/main" val="1108626097"/>
-              </p:ext>
-            </p:extLst>
-          </p:nvPr>
-        </p:nvGraphicFramePr>
-        <p:xfrm>
-          <a:off x="866480" y="1263193"/>
-          <a:ext cx="10515600" cy="5594807"/>
-        </p:xfrm>
-        <a:graphic>
-          <a:graphicData uri="http://schemas.openxmlformats.org/drawingml/2006/table">
-            <a:tbl>
-              <a:tblPr firstRow="1" bandRow="1">
-                <a:tableStyleId>{0505E3EF-67EA-436B-97B2-0124C06EBD24}</a:tableStyleId>
-              </a:tblPr>
-              <a:tblGrid>
-                <a:gridCol w="2894814">
-                  <a:extLst>
-                    <a:ext uri="{9D8B030D-6E8A-4147-A177-3AD203B41FA5}">
-                      <a16:colId xmlns:a16="http://schemas.microsoft.com/office/drawing/2014/main" val="3775642875"/>
-                    </a:ext>
-                  </a:extLst>
-                </a:gridCol>
-                <a:gridCol w="7620786">
-                  <a:extLst>
-                    <a:ext uri="{9D8B030D-6E8A-4147-A177-3AD203B41FA5}">
-                      <a16:colId xmlns:a16="http://schemas.microsoft.com/office/drawing/2014/main" val="2905282473"/>
-                    </a:ext>
-                  </a:extLst>
-                </a:gridCol>
-              </a:tblGrid>
-              <a:tr h="1487816">
-                <a:tc>
-                  <a:txBody>
-                    <a:bodyPr/>
-                    <a:lstStyle/>
-                    <a:p>
-                      <a:r>
-                        <a:rPr lang="en-US" dirty="0" smtClean="0"/>
-                        <a:t>Class – 24</a:t>
-                      </a:r>
-                      <a:endParaRPr lang="en-US" dirty="0"/>
-                    </a:p>
-                  </a:txBody>
-                  <a:tcPr/>
-                </a:tc>
-                <a:tc>
-                  <a:txBody>
-                    <a:bodyPr/>
-                    <a:lstStyle/>
-                    <a:p>
-                      <a:pPr marL="285750" indent="-285750">
-                        <a:buFont typeface="Wingdings" panose="05000000000000000000" pitchFamily="2" charset="2"/>
-                        <a:buChar char="ü"/>
-                      </a:pPr>
-                      <a:r>
-                        <a:rPr lang="en-US" dirty="0" smtClean="0"/>
-                        <a:t>PIP</a:t>
-                      </a:r>
-                    </a:p>
-                    <a:p>
-                      <a:pPr marL="285750" indent="-285750">
-                        <a:buFont typeface="Wingdings" panose="05000000000000000000" pitchFamily="2" charset="2"/>
-                        <a:buChar char="ü"/>
-                      </a:pPr>
-                      <a:r>
-                        <a:rPr lang="en-US" dirty="0" smtClean="0"/>
-                        <a:t>Virtual Environment</a:t>
-                      </a:r>
-                    </a:p>
-                    <a:p>
-                      <a:pPr marL="285750" indent="-285750">
-                        <a:buFont typeface="Wingdings" panose="05000000000000000000" pitchFamily="2" charset="2"/>
-                        <a:buChar char="ü"/>
-                      </a:pPr>
-                      <a:r>
-                        <a:rPr lang="en-US" dirty="0" err="1" smtClean="0"/>
-                        <a:t>Numpy</a:t>
-                      </a:r>
-                      <a:endParaRPr lang="en-US" dirty="0" smtClean="0"/>
-                    </a:p>
-                    <a:p>
-                      <a:pPr marL="285750" indent="-285750">
-                        <a:buFont typeface="Wingdings" panose="05000000000000000000" pitchFamily="2" charset="2"/>
-                        <a:buChar char="ü"/>
-                      </a:pPr>
-                      <a:r>
-                        <a:rPr lang="en-US" dirty="0" smtClean="0"/>
-                        <a:t>Pandas</a:t>
-                      </a:r>
-                    </a:p>
-                    <a:p>
-                      <a:pPr marL="285750" indent="-285750">
-                        <a:buFont typeface="Wingdings" panose="05000000000000000000" pitchFamily="2" charset="2"/>
-                        <a:buChar char="ü"/>
-                      </a:pPr>
-                      <a:r>
-                        <a:rPr lang="en-US" dirty="0" smtClean="0"/>
-                        <a:t>[Game</a:t>
-                      </a:r>
-                      <a:r>
-                        <a:rPr lang="en-US" baseline="0" dirty="0" smtClean="0"/>
-                        <a:t> Project]</a:t>
-                      </a:r>
-                      <a:endParaRPr lang="en-US" dirty="0"/>
-                    </a:p>
-                  </a:txBody>
-                  <a:tcPr/>
-                </a:tc>
-                <a:extLst>
-                  <a:ext uri="{0D108BD9-81ED-4DB2-BD59-A6C34878D82A}">
-                    <a16:rowId xmlns:a16="http://schemas.microsoft.com/office/drawing/2014/main" val="3451149256"/>
-                  </a:ext>
-                </a:extLst>
-              </a:tr>
-              <a:tr h="377120">
-                <a:tc>
-                  <a:txBody>
-                    <a:bodyPr/>
-                    <a:lstStyle/>
-                    <a:p>
-                      <a:r>
-                        <a:rPr lang="en-US" dirty="0" smtClean="0"/>
-                        <a:t>Class – 25</a:t>
-                      </a:r>
-                      <a:endParaRPr lang="en-US" dirty="0"/>
-                    </a:p>
-                  </a:txBody>
-                  <a:tcPr/>
-                </a:tc>
-                <a:tc>
-                  <a:txBody>
-                    <a:bodyPr/>
-                    <a:lstStyle/>
-                    <a:p>
-                      <a:pPr marL="285750" indent="-285750">
-                        <a:buFont typeface="Wingdings" panose="05000000000000000000" pitchFamily="2" charset="2"/>
-                        <a:buChar char="ü"/>
-                      </a:pPr>
-                      <a:r>
-                        <a:rPr lang="en-US" dirty="0" err="1" smtClean="0"/>
-                        <a:t>Git</a:t>
-                      </a:r>
-                      <a:r>
-                        <a:rPr lang="en-US" dirty="0" smtClean="0"/>
-                        <a:t> and GitHub</a:t>
-                      </a:r>
-                      <a:endParaRPr lang="en-US" dirty="0"/>
-                    </a:p>
-                  </a:txBody>
-                  <a:tcPr/>
-                </a:tc>
-                <a:extLst>
-                  <a:ext uri="{0D108BD9-81ED-4DB2-BD59-A6C34878D82A}">
-                    <a16:rowId xmlns:a16="http://schemas.microsoft.com/office/drawing/2014/main" val="1661549578"/>
-                  </a:ext>
-                </a:extLst>
-              </a:tr>
-              <a:tr h="650919">
-                <a:tc>
-                  <a:txBody>
-                    <a:bodyPr/>
-                    <a:lstStyle/>
-                    <a:p>
-                      <a:r>
-                        <a:rPr lang="en-US" dirty="0" smtClean="0"/>
-                        <a:t>Class – 26</a:t>
-                      </a:r>
-                      <a:endParaRPr lang="en-US" dirty="0"/>
-                    </a:p>
-                  </a:txBody>
-                  <a:tcPr/>
-                </a:tc>
-                <a:tc>
-                  <a:txBody>
-                    <a:bodyPr/>
-                    <a:lstStyle/>
-                    <a:p>
-                      <a:pPr marL="285750" marR="0" lvl="0" indent="-285750" algn="l" defTabSz="914400" rtl="0" eaLnBrk="1" fontAlgn="auto" latinLnBrk="0" hangingPunct="1">
-                        <a:lnSpc>
-                          <a:spcPct val="100000"/>
-                        </a:lnSpc>
-                        <a:spcBef>
-                          <a:spcPts val="0"/>
-                        </a:spcBef>
-                        <a:spcAft>
-                          <a:spcPts val="0"/>
-                        </a:spcAft>
-                        <a:buClrTx/>
-                        <a:buSzTx/>
-                        <a:buFont typeface="Wingdings" panose="05000000000000000000" pitchFamily="2" charset="2"/>
-                        <a:buChar char="ü"/>
-                        <a:tabLst/>
-                        <a:defRPr/>
-                      </a:pPr>
-                      <a:r>
-                        <a:rPr lang="en-US" sz="1800" b="0" i="0" kern="1200" dirty="0" smtClean="0">
-                          <a:solidFill>
-                            <a:schemeClr val="dk1"/>
-                          </a:solidFill>
-                          <a:effectLst/>
-                          <a:latin typeface="+mn-lt"/>
-                          <a:ea typeface="+mn-ea"/>
-                          <a:cs typeface="+mn-cs"/>
-                        </a:rPr>
-                        <a:t>Fundamental of Database management system</a:t>
-                      </a:r>
-                    </a:p>
-                    <a:p>
-                      <a:pPr marL="285750" marR="0" lvl="0" indent="-285750" algn="l" defTabSz="914400" rtl="0" eaLnBrk="1" fontAlgn="auto" latinLnBrk="0" hangingPunct="1">
-                        <a:lnSpc>
-                          <a:spcPct val="100000"/>
-                        </a:lnSpc>
-                        <a:spcBef>
-                          <a:spcPts val="0"/>
-                        </a:spcBef>
-                        <a:spcAft>
-                          <a:spcPts val="0"/>
-                        </a:spcAft>
-                        <a:buClrTx/>
-                        <a:buSzTx/>
-                        <a:buFont typeface="Wingdings" panose="05000000000000000000" pitchFamily="2" charset="2"/>
-                        <a:buChar char="ü"/>
-                        <a:tabLst/>
-                        <a:defRPr/>
-                      </a:pPr>
-                      <a:r>
-                        <a:rPr lang="en-US" sz="1800" b="0" i="0" kern="1200" dirty="0" smtClean="0">
-                          <a:solidFill>
-                            <a:schemeClr val="dk1"/>
-                          </a:solidFill>
-                          <a:effectLst/>
-                          <a:latin typeface="+mn-lt"/>
-                          <a:ea typeface="+mn-ea"/>
-                          <a:cs typeface="+mn-cs"/>
-                        </a:rPr>
-                        <a:t>SQL Query</a:t>
-                      </a:r>
-                    </a:p>
-                  </a:txBody>
-                  <a:tcPr/>
-                </a:tc>
-                <a:extLst>
-                  <a:ext uri="{0D108BD9-81ED-4DB2-BD59-A6C34878D82A}">
-                    <a16:rowId xmlns:a16="http://schemas.microsoft.com/office/drawing/2014/main" val="1881348200"/>
-                  </a:ext>
-                </a:extLst>
-              </a:tr>
-              <a:tr h="377120">
-                <a:tc>
-                  <a:txBody>
-                    <a:bodyPr/>
-                    <a:lstStyle/>
-                    <a:p>
-                      <a:r>
-                        <a:rPr lang="en-US" dirty="0" smtClean="0"/>
-                        <a:t>Class – 27</a:t>
-                      </a:r>
-                      <a:endParaRPr lang="en-US" dirty="0"/>
-                    </a:p>
-                  </a:txBody>
-                  <a:tcPr/>
-                </a:tc>
-                <a:tc>
-                  <a:txBody>
-                    <a:bodyPr/>
-                    <a:lstStyle/>
-                    <a:p>
-                      <a:pPr marL="285750" marR="0" lvl="0" indent="-285750" algn="l" defTabSz="914400" rtl="0" eaLnBrk="1" fontAlgn="auto" latinLnBrk="0" hangingPunct="1">
-                        <a:lnSpc>
-                          <a:spcPct val="100000"/>
-                        </a:lnSpc>
-                        <a:spcBef>
-                          <a:spcPts val="0"/>
-                        </a:spcBef>
-                        <a:spcAft>
-                          <a:spcPts val="0"/>
-                        </a:spcAft>
-                        <a:buClrTx/>
-                        <a:buSzTx/>
-                        <a:buFont typeface="Wingdings" panose="05000000000000000000" pitchFamily="2" charset="2"/>
-                        <a:buChar char="ü"/>
-                        <a:tabLst/>
-                        <a:defRPr/>
-                      </a:pPr>
-                      <a:r>
-                        <a:rPr lang="en-US" sz="1800" b="0" i="0" kern="1200" dirty="0" smtClean="0">
-                          <a:solidFill>
-                            <a:schemeClr val="dk1"/>
-                          </a:solidFill>
-                          <a:effectLst/>
-                          <a:latin typeface="+mn-lt"/>
-                          <a:ea typeface="+mn-ea"/>
-                          <a:cs typeface="+mn-cs"/>
-                        </a:rPr>
-                        <a:t>SQL Query</a:t>
-                      </a:r>
-                    </a:p>
-                  </a:txBody>
-                  <a:tcPr/>
-                </a:tc>
-                <a:extLst>
-                  <a:ext uri="{0D108BD9-81ED-4DB2-BD59-A6C34878D82A}">
-                    <a16:rowId xmlns:a16="http://schemas.microsoft.com/office/drawing/2014/main" val="3562368292"/>
-                  </a:ext>
-                </a:extLst>
-              </a:tr>
-              <a:tr h="377120">
-                <a:tc>
-                  <a:txBody>
-                    <a:bodyPr/>
-                    <a:lstStyle/>
-                    <a:p>
-                      <a:r>
-                        <a:rPr lang="en-US" dirty="0" smtClean="0"/>
-                        <a:t>Class – 28</a:t>
-                      </a:r>
-                      <a:endParaRPr lang="en-US" dirty="0"/>
-                    </a:p>
-                  </a:txBody>
-                  <a:tcPr/>
-                </a:tc>
-                <a:tc>
-                  <a:txBody>
-                    <a:bodyPr/>
-                    <a:lstStyle/>
-                    <a:p>
-                      <a:pPr marL="285750" marR="0" lvl="0" indent="-285750" algn="l" defTabSz="914400" rtl="0" eaLnBrk="1" fontAlgn="auto" latinLnBrk="0" hangingPunct="1">
-                        <a:lnSpc>
-                          <a:spcPct val="100000"/>
-                        </a:lnSpc>
-                        <a:spcBef>
-                          <a:spcPts val="0"/>
-                        </a:spcBef>
-                        <a:spcAft>
-                          <a:spcPts val="0"/>
-                        </a:spcAft>
-                        <a:buClrTx/>
-                        <a:buSzTx/>
-                        <a:buFont typeface="Wingdings" panose="05000000000000000000" pitchFamily="2" charset="2"/>
-                        <a:buChar char="ü"/>
-                        <a:tabLst/>
-                        <a:defRPr/>
-                      </a:pPr>
-                      <a:r>
-                        <a:rPr lang="en-US" sz="1800" b="0" i="0" kern="1200" dirty="0" smtClean="0">
-                          <a:solidFill>
-                            <a:schemeClr val="dk1"/>
-                          </a:solidFill>
-                          <a:effectLst/>
-                          <a:latin typeface="+mn-lt"/>
-                          <a:ea typeface="+mn-ea"/>
-                          <a:cs typeface="+mn-cs"/>
-                        </a:rPr>
-                        <a:t>[Fundamental]</a:t>
-                      </a:r>
-                      <a:r>
-                        <a:rPr lang="en-US" sz="1800" b="0" i="0" kern="1200" baseline="0" dirty="0" smtClean="0">
-                          <a:solidFill>
-                            <a:schemeClr val="dk1"/>
-                          </a:solidFill>
-                          <a:effectLst/>
-                          <a:latin typeface="+mn-lt"/>
-                          <a:ea typeface="+mn-ea"/>
-                          <a:cs typeface="+mn-cs"/>
-                        </a:rPr>
-                        <a:t> </a:t>
-                      </a:r>
-                      <a:r>
-                        <a:rPr lang="en-US" sz="1800" b="0" i="0" kern="1200" dirty="0" smtClean="0">
-                          <a:solidFill>
-                            <a:schemeClr val="dk1"/>
-                          </a:solidFill>
-                          <a:effectLst/>
-                          <a:latin typeface="+mn-lt"/>
-                          <a:ea typeface="+mn-ea"/>
-                          <a:cs typeface="+mn-cs"/>
-                        </a:rPr>
-                        <a:t>HTML, CSS, JavaScript</a:t>
-                      </a:r>
-                    </a:p>
-                  </a:txBody>
-                  <a:tcPr/>
-                </a:tc>
-                <a:extLst>
-                  <a:ext uri="{0D108BD9-81ED-4DB2-BD59-A6C34878D82A}">
-                    <a16:rowId xmlns:a16="http://schemas.microsoft.com/office/drawing/2014/main" val="1483529025"/>
-                  </a:ext>
-                </a:extLst>
-              </a:tr>
-              <a:tr h="2324712">
-                <a:tc>
-                  <a:txBody>
-                    <a:bodyPr/>
-                    <a:lstStyle/>
-                    <a:p>
-                      <a:r>
-                        <a:rPr lang="en-US" dirty="0" smtClean="0"/>
-                        <a:t>Class – 29</a:t>
-                      </a:r>
-                      <a:endParaRPr lang="en-US" dirty="0"/>
-                    </a:p>
-                  </a:txBody>
-                  <a:tcPr/>
-                </a:tc>
-                <a:tc>
-                  <a:txBody>
-                    <a:bodyPr/>
-                    <a:lstStyle/>
-                    <a:p>
-                      <a:pPr marL="285750" marR="0" lvl="0" indent="-285750" algn="l" defTabSz="914400" rtl="0" eaLnBrk="1" fontAlgn="auto" latinLnBrk="0" hangingPunct="1">
-                        <a:lnSpc>
-                          <a:spcPct val="100000"/>
-                        </a:lnSpc>
-                        <a:spcBef>
-                          <a:spcPts val="0"/>
-                        </a:spcBef>
-                        <a:spcAft>
-                          <a:spcPts val="0"/>
-                        </a:spcAft>
-                        <a:buClrTx/>
-                        <a:buSzTx/>
-                        <a:buFont typeface="Wingdings" panose="05000000000000000000" pitchFamily="2" charset="2"/>
-                        <a:buChar char="ü"/>
-                        <a:tabLst/>
-                        <a:defRPr/>
-                      </a:pPr>
-                      <a:r>
-                        <a:rPr lang="en-US" sz="1800" b="0" i="0" kern="1200" dirty="0" smtClean="0">
-                          <a:solidFill>
-                            <a:schemeClr val="dk1"/>
-                          </a:solidFill>
-                          <a:effectLst/>
-                          <a:latin typeface="+mn-lt"/>
-                          <a:ea typeface="+mn-ea"/>
-                          <a:cs typeface="+mn-cs"/>
-                        </a:rPr>
-                        <a:t>Django Project MVT Structure</a:t>
-                      </a:r>
-                    </a:p>
-                    <a:p>
-                      <a:pPr marL="285750" marR="0" lvl="0" indent="-285750" algn="l" defTabSz="914400" rtl="0" eaLnBrk="1" fontAlgn="auto" latinLnBrk="0" hangingPunct="1">
-                        <a:lnSpc>
-                          <a:spcPct val="100000"/>
-                        </a:lnSpc>
-                        <a:spcBef>
-                          <a:spcPts val="0"/>
-                        </a:spcBef>
-                        <a:spcAft>
-                          <a:spcPts val="0"/>
-                        </a:spcAft>
-                        <a:buClrTx/>
-                        <a:buSzTx/>
-                        <a:buFont typeface="Wingdings" panose="05000000000000000000" pitchFamily="2" charset="2"/>
-                        <a:buChar char="ü"/>
-                        <a:tabLst/>
-                        <a:defRPr/>
-                      </a:pPr>
-                      <a:r>
-                        <a:rPr lang="en-US" sz="1800" b="0" i="0" kern="1200" dirty="0" smtClean="0">
-                          <a:solidFill>
-                            <a:schemeClr val="dk1"/>
-                          </a:solidFill>
-                          <a:effectLst/>
-                          <a:latin typeface="+mn-lt"/>
-                          <a:ea typeface="+mn-ea"/>
-                          <a:cs typeface="+mn-cs"/>
-                        </a:rPr>
-                        <a:t>Django Model</a:t>
-                      </a:r>
-                    </a:p>
-                    <a:p>
-                      <a:pPr marL="285750" marR="0" lvl="0" indent="-285750" algn="l" defTabSz="914400" rtl="0" eaLnBrk="1" fontAlgn="auto" latinLnBrk="0" hangingPunct="1">
-                        <a:lnSpc>
-                          <a:spcPct val="100000"/>
-                        </a:lnSpc>
-                        <a:spcBef>
-                          <a:spcPts val="0"/>
-                        </a:spcBef>
-                        <a:spcAft>
-                          <a:spcPts val="0"/>
-                        </a:spcAft>
-                        <a:buClrTx/>
-                        <a:buSzTx/>
-                        <a:buFont typeface="Wingdings" panose="05000000000000000000" pitchFamily="2" charset="2"/>
-                        <a:buChar char="ü"/>
-                        <a:tabLst/>
-                        <a:defRPr/>
-                      </a:pPr>
-                      <a:r>
-                        <a:rPr lang="en-US" sz="1800" b="0" i="0" kern="1200" dirty="0" smtClean="0">
-                          <a:solidFill>
-                            <a:schemeClr val="dk1"/>
-                          </a:solidFill>
-                          <a:effectLst/>
-                          <a:latin typeface="+mn-lt"/>
-                          <a:ea typeface="+mn-ea"/>
-                          <a:cs typeface="+mn-cs"/>
-                        </a:rPr>
-                        <a:t>Django View</a:t>
-                      </a:r>
-                    </a:p>
-                    <a:p>
-                      <a:pPr marL="285750" marR="0" lvl="0" indent="-285750" algn="l" defTabSz="914400" rtl="0" eaLnBrk="1" fontAlgn="auto" latinLnBrk="0" hangingPunct="1">
-                        <a:lnSpc>
-                          <a:spcPct val="100000"/>
-                        </a:lnSpc>
-                        <a:spcBef>
-                          <a:spcPts val="0"/>
-                        </a:spcBef>
-                        <a:spcAft>
-                          <a:spcPts val="0"/>
-                        </a:spcAft>
-                        <a:buClrTx/>
-                        <a:buSzTx/>
-                        <a:buFont typeface="Wingdings" panose="05000000000000000000" pitchFamily="2" charset="2"/>
-                        <a:buChar char="ü"/>
-                        <a:tabLst/>
-                        <a:defRPr/>
-                      </a:pPr>
-                      <a:r>
-                        <a:rPr lang="en-US" sz="1800" b="0" i="0" kern="1200" dirty="0" smtClean="0">
-                          <a:solidFill>
-                            <a:schemeClr val="dk1"/>
-                          </a:solidFill>
-                          <a:effectLst/>
-                          <a:latin typeface="+mn-lt"/>
-                          <a:ea typeface="+mn-ea"/>
-                          <a:cs typeface="+mn-cs"/>
-                        </a:rPr>
-                        <a:t>Django Template</a:t>
-                      </a:r>
-                    </a:p>
-                    <a:p>
-                      <a:pPr marL="285750" marR="0" lvl="0" indent="-285750" algn="l" defTabSz="914400" rtl="0" eaLnBrk="1" fontAlgn="auto" latinLnBrk="0" hangingPunct="1">
-                        <a:lnSpc>
-                          <a:spcPct val="100000"/>
-                        </a:lnSpc>
-                        <a:spcBef>
-                          <a:spcPts val="0"/>
-                        </a:spcBef>
-                        <a:spcAft>
-                          <a:spcPts val="0"/>
-                        </a:spcAft>
-                        <a:buClrTx/>
-                        <a:buSzTx/>
-                        <a:buFont typeface="Wingdings" panose="05000000000000000000" pitchFamily="2" charset="2"/>
-                        <a:buChar char="ü"/>
-                        <a:tabLst/>
-                        <a:defRPr/>
-                      </a:pPr>
-                      <a:r>
-                        <a:rPr lang="en-US" sz="1800" b="0" i="0" kern="1200" dirty="0" smtClean="0">
-                          <a:solidFill>
-                            <a:schemeClr val="dk1"/>
-                          </a:solidFill>
-                          <a:effectLst/>
-                          <a:latin typeface="+mn-lt"/>
-                          <a:ea typeface="+mn-ea"/>
-                          <a:cs typeface="+mn-cs"/>
-                        </a:rPr>
-                        <a:t>Django URL Mapping</a:t>
-                      </a:r>
-                    </a:p>
-                    <a:p>
-                      <a:pPr marL="285750" marR="0" lvl="0" indent="-285750" algn="l" defTabSz="914400" rtl="0" eaLnBrk="1" fontAlgn="auto" latinLnBrk="0" hangingPunct="1">
-                        <a:lnSpc>
-                          <a:spcPct val="100000"/>
-                        </a:lnSpc>
-                        <a:spcBef>
-                          <a:spcPts val="0"/>
-                        </a:spcBef>
-                        <a:spcAft>
-                          <a:spcPts val="0"/>
-                        </a:spcAft>
-                        <a:buClrTx/>
-                        <a:buSzTx/>
-                        <a:buFont typeface="Wingdings" panose="05000000000000000000" pitchFamily="2" charset="2"/>
-                        <a:buChar char="ü"/>
-                        <a:tabLst/>
-                        <a:defRPr/>
-                      </a:pPr>
-                      <a:r>
-                        <a:rPr lang="en-US" sz="1800" b="0" i="0" kern="1200" dirty="0" smtClean="0">
-                          <a:solidFill>
-                            <a:schemeClr val="dk1"/>
-                          </a:solidFill>
-                          <a:effectLst/>
-                          <a:latin typeface="+mn-lt"/>
-                          <a:ea typeface="+mn-ea"/>
-                          <a:cs typeface="+mn-cs"/>
-                        </a:rPr>
-                        <a:t>Django Model Forms</a:t>
-                      </a:r>
-                    </a:p>
-                    <a:p>
-                      <a:pPr marL="285750" marR="0" lvl="0" indent="-285750" algn="l" defTabSz="914400" rtl="0" eaLnBrk="1" fontAlgn="auto" latinLnBrk="0" hangingPunct="1">
-                        <a:lnSpc>
-                          <a:spcPct val="100000"/>
-                        </a:lnSpc>
-                        <a:spcBef>
-                          <a:spcPts val="0"/>
-                        </a:spcBef>
-                        <a:spcAft>
-                          <a:spcPts val="0"/>
-                        </a:spcAft>
-                        <a:buClrTx/>
-                        <a:buSzTx/>
-                        <a:buFont typeface="Wingdings" panose="05000000000000000000" pitchFamily="2" charset="2"/>
-                        <a:buChar char="ü"/>
-                        <a:tabLst/>
-                        <a:defRPr/>
-                      </a:pPr>
-                      <a:r>
-                        <a:rPr lang="en-US" sz="1800" b="0" i="0" kern="1200" dirty="0" smtClean="0">
-                          <a:solidFill>
-                            <a:schemeClr val="dk1"/>
-                          </a:solidFill>
-                          <a:effectLst/>
-                          <a:latin typeface="+mn-lt"/>
-                          <a:ea typeface="+mn-ea"/>
-                          <a:cs typeface="+mn-cs"/>
-                        </a:rPr>
-                        <a:t>Django Forms</a:t>
-                      </a:r>
-                    </a:p>
-                    <a:p>
-                      <a:pPr marL="285750" marR="0" lvl="0" indent="-285750" algn="l" defTabSz="914400" rtl="0" eaLnBrk="1" fontAlgn="auto" latinLnBrk="0" hangingPunct="1">
-                        <a:lnSpc>
-                          <a:spcPct val="100000"/>
-                        </a:lnSpc>
-                        <a:spcBef>
-                          <a:spcPts val="0"/>
-                        </a:spcBef>
-                        <a:spcAft>
-                          <a:spcPts val="0"/>
-                        </a:spcAft>
-                        <a:buClrTx/>
-                        <a:buSzTx/>
-                        <a:buFont typeface="Wingdings" panose="05000000000000000000" pitchFamily="2" charset="2"/>
-                        <a:buChar char="ü"/>
-                        <a:tabLst/>
-                        <a:defRPr/>
-                      </a:pPr>
-                      <a:r>
-                        <a:rPr lang="en-US" sz="1800" b="0" i="0" kern="1200" dirty="0" smtClean="0">
-                          <a:solidFill>
-                            <a:schemeClr val="dk1"/>
-                          </a:solidFill>
-                          <a:effectLst/>
-                          <a:latin typeface="+mn-lt"/>
-                          <a:ea typeface="+mn-ea"/>
-                          <a:cs typeface="+mn-cs"/>
-                        </a:rPr>
-                        <a:t>Form Validation</a:t>
-                      </a:r>
-                    </a:p>
-                  </a:txBody>
-                  <a:tcPr/>
-                </a:tc>
-                <a:extLst>
-                  <a:ext uri="{0D108BD9-81ED-4DB2-BD59-A6C34878D82A}">
-                    <a16:rowId xmlns:a16="http://schemas.microsoft.com/office/drawing/2014/main" val="1528733060"/>
-                  </a:ext>
-                </a:extLst>
-              </a:tr>
-            </a:tbl>
-          </a:graphicData>
-        </a:graphic>
-      </p:graphicFrame>
-    </p:spTree>
-    <p:extLst>
-      <p:ext uri="{BB962C8B-B14F-4D97-AF65-F5344CB8AC3E}">
-        <p14:creationId xmlns:p14="http://schemas.microsoft.com/office/powerpoint/2010/main" val="2750984024"/>
-      </p:ext>
-    </p:extLst>
-  </p:cSld>
-  <p:clrMapOvr>
-    <a:masterClrMapping/>
-  </p:clrMapOvr>
-  <p:timing>
-    <p:tnLst>
-      <p:par>
-        <p:cTn id="1" dur="indefinite" restart="never" nodeType="tmRoot"/>
-      </p:par>
-    </p:tnLst>
-  </p:timing>
-</p:sld>
-</file>
-
-<file path=ppt/slides/slide13.xml><?xml version="1.0" encoding="utf-8"?>
-<p:sld xmlns:a="http://schemas.openxmlformats.org/drawingml/2006/main" xmlns:r="http://schemas.openxmlformats.org/officeDocument/2006/relationships" xmlns:p="http://schemas.openxmlformats.org/presentationml/2006/main">
-  <p:cSld>
-    <p:spTree>
-      <p:nvGrpSpPr>
-        <p:cNvPr id="1" name=""/>
-        <p:cNvGrpSpPr/>
-        <p:nvPr/>
-      </p:nvGrpSpPr>
-      <p:grpSpPr>
-        <a:xfrm>
-          <a:off x="0" y="0"/>
-          <a:ext cx="0" cy="0"/>
-          <a:chOff x="0" y="0"/>
-          <a:chExt cx="0" cy="0"/>
-        </a:xfrm>
-      </p:grpSpPr>
-      <p:sp>
-        <p:nvSpPr>
-          <p:cNvPr id="2" name="Title 1"/>
-          <p:cNvSpPr>
-            <a:spLocks noGrp="1"/>
-          </p:cNvSpPr>
-          <p:nvPr>
-            <p:ph type="title"/>
-          </p:nvPr>
-        </p:nvSpPr>
-        <p:spPr/>
-        <p:txBody>
-          <a:bodyPr/>
-          <a:lstStyle/>
-          <a:p>
-            <a:pPr algn="ctr"/>
-            <a:r>
-              <a:rPr lang="as-IN" b="1" dirty="0" smtClean="0"/>
-              <a:t>কোর্সে যা কিছু আছে</a:t>
-            </a:r>
-            <a:endParaRPr lang="en-US" dirty="0"/>
-          </a:p>
-        </p:txBody>
-      </p:sp>
-      <p:graphicFrame>
-        <p:nvGraphicFramePr>
-          <p:cNvPr id="4" name="Content Placeholder 3"/>
-          <p:cNvGraphicFramePr>
-            <a:graphicFrameLocks noGrp="1"/>
-          </p:cNvGraphicFramePr>
-          <p:nvPr>
-            <p:ph idx="1"/>
-            <p:extLst>
-              <p:ext uri="{D42A27DB-BD31-4B8C-83A1-F6EECF244321}">
-                <p14:modId xmlns:p14="http://schemas.microsoft.com/office/powerpoint/2010/main" val="3265906403"/>
-              </p:ext>
-            </p:extLst>
-          </p:nvPr>
-        </p:nvGraphicFramePr>
-        <p:xfrm>
-          <a:off x="838200" y="1825625"/>
-          <a:ext cx="10515600" cy="1112520"/>
-        </p:xfrm>
-        <a:graphic>
-          <a:graphicData uri="http://schemas.openxmlformats.org/drawingml/2006/table">
-            <a:tbl>
-              <a:tblPr firstRow="1" bandRow="1">
-                <a:tableStyleId>{0505E3EF-67EA-436B-97B2-0124C06EBD24}</a:tableStyleId>
-              </a:tblPr>
-              <a:tblGrid>
-                <a:gridCol w="3535837">
-                  <a:extLst>
-                    <a:ext uri="{9D8B030D-6E8A-4147-A177-3AD203B41FA5}">
-                      <a16:colId xmlns:a16="http://schemas.microsoft.com/office/drawing/2014/main" val="3290661833"/>
-                    </a:ext>
-                  </a:extLst>
-                </a:gridCol>
-                <a:gridCol w="6979763">
-                  <a:extLst>
-                    <a:ext uri="{9D8B030D-6E8A-4147-A177-3AD203B41FA5}">
-                      <a16:colId xmlns:a16="http://schemas.microsoft.com/office/drawing/2014/main" val="3572811344"/>
-                    </a:ext>
-                  </a:extLst>
-                </a:gridCol>
-              </a:tblGrid>
-              <a:tr h="370840">
-                <a:tc rowSpan="2">
-                  <a:txBody>
-                    <a:bodyPr/>
-                    <a:lstStyle/>
-                    <a:p>
-                      <a:pPr algn="ctr"/>
-                      <a:r>
-                        <a:rPr lang="en-US" dirty="0" smtClean="0"/>
-                        <a:t>Class – 30</a:t>
-                      </a:r>
-                      <a:endParaRPr lang="en-US" dirty="0"/>
-                    </a:p>
-                  </a:txBody>
-                  <a:tcPr/>
-                </a:tc>
-                <a:tc>
-                  <a:txBody>
-                    <a:bodyPr/>
-                    <a:lstStyle/>
-                    <a:p>
-                      <a:r>
-                        <a:rPr lang="en-US" dirty="0" smtClean="0"/>
-                        <a:t>[Project - 1] YouTube</a:t>
-                      </a:r>
-                      <a:r>
-                        <a:rPr lang="en-US" baseline="0" dirty="0" smtClean="0"/>
-                        <a:t> Video To MP3 Converter</a:t>
-                      </a:r>
-                      <a:endParaRPr lang="en-US" dirty="0"/>
-                    </a:p>
-                  </a:txBody>
-                  <a:tcPr/>
-                </a:tc>
-                <a:extLst>
-                  <a:ext uri="{0D108BD9-81ED-4DB2-BD59-A6C34878D82A}">
-                    <a16:rowId xmlns:a16="http://schemas.microsoft.com/office/drawing/2014/main" val="2742245374"/>
-                  </a:ext>
-                </a:extLst>
-              </a:tr>
-              <a:tr h="370840">
-                <a:tc vMerge="1">
-                  <a:txBody>
-                    <a:bodyPr/>
-                    <a:lstStyle/>
-                    <a:p>
-                      <a:endParaRPr lang="en-US" dirty="0"/>
-                    </a:p>
-                  </a:txBody>
-                  <a:tcPr/>
-                </a:tc>
-                <a:tc>
-                  <a:txBody>
-                    <a:bodyPr/>
-                    <a:lstStyle/>
-                    <a:p>
-                      <a:r>
-                        <a:rPr lang="en-US" dirty="0" smtClean="0"/>
-                        <a:t>[Project - 2] Employee Management System </a:t>
-                      </a:r>
-                      <a:endParaRPr lang="en-US" dirty="0"/>
-                    </a:p>
-                  </a:txBody>
-                  <a:tcPr/>
-                </a:tc>
-                <a:extLst>
-                  <a:ext uri="{0D108BD9-81ED-4DB2-BD59-A6C34878D82A}">
-                    <a16:rowId xmlns:a16="http://schemas.microsoft.com/office/drawing/2014/main" val="1377165754"/>
-                  </a:ext>
-                </a:extLst>
-              </a:tr>
-              <a:tr h="370840">
-                <a:tc>
-                  <a:txBody>
-                    <a:bodyPr/>
-                    <a:lstStyle/>
-                    <a:p>
-                      <a:pPr algn="ctr"/>
-                      <a:r>
-                        <a:rPr lang="en-US" dirty="0" smtClean="0"/>
-                        <a:t>Task Individual </a:t>
-                      </a:r>
-                      <a:endParaRPr lang="en-US" dirty="0"/>
-                    </a:p>
-                  </a:txBody>
-                  <a:tcPr/>
-                </a:tc>
-                <a:tc>
-                  <a:txBody>
-                    <a:bodyPr/>
-                    <a:lstStyle/>
-                    <a:p>
-                      <a:pPr marL="285750" indent="-285750">
-                        <a:buFont typeface="Wingdings" panose="05000000000000000000" pitchFamily="2" charset="2"/>
-                        <a:buChar char="Ø"/>
-                      </a:pPr>
-                      <a:r>
-                        <a:rPr lang="en-US" dirty="0" smtClean="0"/>
-                        <a:t>Project Related Work – Self Assessment </a:t>
-                      </a:r>
-                      <a:endParaRPr lang="en-US" dirty="0"/>
-                    </a:p>
-                  </a:txBody>
-                  <a:tcPr/>
-                </a:tc>
-                <a:extLst>
-                  <a:ext uri="{0D108BD9-81ED-4DB2-BD59-A6C34878D82A}">
-                    <a16:rowId xmlns:a16="http://schemas.microsoft.com/office/drawing/2014/main" val="2197634958"/>
-                  </a:ext>
-                </a:extLst>
-              </a:tr>
-            </a:tbl>
-          </a:graphicData>
-        </a:graphic>
-      </p:graphicFrame>
-    </p:spTree>
-    <p:extLst>
-      <p:ext uri="{BB962C8B-B14F-4D97-AF65-F5344CB8AC3E}">
-        <p14:creationId xmlns:p14="http://schemas.microsoft.com/office/powerpoint/2010/main" val="149978660"/>
-      </p:ext>
-    </p:extLst>
-  </p:cSld>
-  <p:clrMapOvr>
-    <a:masterClrMapping/>
-  </p:clrMapOvr>
-  <p:timing>
-    <p:tnLst>
-      <p:par>
-        <p:cTn id="1" dur="indefinite" restart="never" nodeType="tmRoot"/>
-      </p:par>
-    </p:tnLst>
-  </p:timing>
 </p:sld>
 </file>
 
@@ -5685,8 +3692,8 @@
         </p:nvSpPr>
         <p:spPr>
           <a:xfrm>
-            <a:off x="838200" y="365125"/>
-            <a:ext cx="10515600" cy="5338091"/>
+            <a:off x="838200" y="365126"/>
+            <a:ext cx="10515600" cy="2456134"/>
           </a:xfrm>
         </p:spPr>
         <p:txBody>
@@ -5702,6 +3709,42 @@
           </a:p>
         </p:txBody>
       </p:sp>
+      <p:pic>
+        <p:nvPicPr>
+          <p:cNvPr id="4" name="Picture 3">
+            <a:extLst>
+              <a:ext uri="{FF2B5EF4-FFF2-40B4-BE49-F238E27FC236}">
+                <a16:creationId xmlns:a16="http://schemas.microsoft.com/office/drawing/2014/main" id="{F3DC3ACD-84FE-AC3E-06B8-016635FCD174}"/>
+              </a:ext>
+            </a:extLst>
+          </p:cNvPr>
+          <p:cNvPicPr>
+            <a:picLocks noChangeAspect="1"/>
+          </p:cNvPicPr>
+          <p:nvPr/>
+        </p:nvPicPr>
+        <p:blipFill>
+          <a:blip r:embed="rId3">
+            <a:extLst>
+              <a:ext uri="{28A0092B-C50C-407E-A947-70E740481C1C}">
+                <a14:useLocalDpi xmlns:a14="http://schemas.microsoft.com/office/drawing/2010/main" val="0"/>
+              </a:ext>
+            </a:extLst>
+          </a:blip>
+          <a:stretch>
+            <a:fillRect/>
+          </a:stretch>
+        </p:blipFill>
+        <p:spPr>
+          <a:xfrm>
+            <a:off x="3211211" y="2117631"/>
+            <a:ext cx="4877481" cy="4093597"/>
+          </a:xfrm>
+          <a:prstGeom prst="rect">
+            <a:avLst/>
+          </a:prstGeom>
+        </p:spPr>
+      </p:pic>
     </p:spTree>
     <p:extLst>
       <p:ext uri="{BB962C8B-B14F-4D97-AF65-F5344CB8AC3E}">
@@ -5712,13 +3755,6 @@
   <p:clrMapOvr>
     <a:masterClrMapping/>
   </p:clrMapOvr>
-  <p:timing>
-    <p:tnLst>
-      <p:par>
-        <p:cTn id="1" dur="indefinite" restart="never" nodeType="tmRoot"/>
-      </p:par>
-    </p:tnLst>
-  </p:timing>
 </p:sld>
 </file>
 
@@ -5752,7 +3788,7 @@
         <p:spPr>
           <a:xfrm>
             <a:off x="838200" y="365125"/>
-            <a:ext cx="10515600" cy="5922553"/>
+            <a:ext cx="10515600" cy="1865119"/>
           </a:xfrm>
         </p:spPr>
         <p:txBody>
@@ -5768,6 +3804,42 @@
           </a:p>
         </p:txBody>
       </p:sp>
+      <p:pic>
+        <p:nvPicPr>
+          <p:cNvPr id="4" name="Picture 3">
+            <a:extLst>
+              <a:ext uri="{FF2B5EF4-FFF2-40B4-BE49-F238E27FC236}">
+                <a16:creationId xmlns:a16="http://schemas.microsoft.com/office/drawing/2014/main" id="{16DEAE79-0E30-4B44-B12F-104854B76784}"/>
+              </a:ext>
+            </a:extLst>
+          </p:cNvPr>
+          <p:cNvPicPr>
+            <a:picLocks noChangeAspect="1"/>
+          </p:cNvPicPr>
+          <p:nvPr/>
+        </p:nvPicPr>
+        <p:blipFill>
+          <a:blip r:embed="rId2">
+            <a:extLst>
+              <a:ext uri="{28A0092B-C50C-407E-A947-70E740481C1C}">
+                <a14:useLocalDpi xmlns:a14="http://schemas.microsoft.com/office/drawing/2010/main" val="0"/>
+              </a:ext>
+            </a:extLst>
+          </a:blip>
+          <a:stretch>
+            <a:fillRect/>
+          </a:stretch>
+        </p:blipFill>
+        <p:spPr>
+          <a:xfrm>
+            <a:off x="3287287" y="1817649"/>
+            <a:ext cx="5372100" cy="4191000"/>
+          </a:xfrm>
+          <a:prstGeom prst="rect">
+            <a:avLst/>
+          </a:prstGeom>
+        </p:spPr>
+      </p:pic>
     </p:spTree>
     <p:extLst>
       <p:ext uri="{BB962C8B-B14F-4D97-AF65-F5344CB8AC3E}">
@@ -5778,13 +3850,6 @@
   <p:clrMapOvr>
     <a:masterClrMapping/>
   </p:clrMapOvr>
-  <p:timing>
-    <p:tnLst>
-      <p:par>
-        <p:cTn id="1" dur="indefinite" restart="never" nodeType="tmRoot"/>
-      </p:par>
-    </p:tnLst>
-  </p:timing>
 </p:sld>
 </file>
 
@@ -5853,23 +3918,23 @@
               <a:buNone/>
             </a:pPr>
             <a:r>
-              <a:rPr lang="as-IN" dirty="0" smtClean="0"/>
-              <a:t>আমরা কোর্সটি এমনভাবে সাজানো হয়েছে যেখানে একাডেমিক ব্যাকগ্রাউন্ড ম্যাটার করে না। আপনি যেকোনো একাডেমিক ব্যাকগ্রাউন্ড থেকে এই কোর্সটি করতে পারবে। </a:t>
+              <a:rPr lang="as-IN" dirty="0"/>
+              <a:t>আমরা কোর্সটি এমনভাবে সাজানো হয়েছে যেখানে একাডেমিক ব্যাকগ্রাউন্ড খুব বেশি গুরুত্ব বহন করে না তবে থাকলে ভালো। আপনি যেকোনো একাডেমিক ব্যাকগ্রাউন্ড থেকে এই কোর্সটি করতে পারবে। </a:t>
             </a:r>
           </a:p>
           <a:p>
             <a:pPr marL="0" indent="0">
               <a:buNone/>
             </a:pPr>
-            <a:endParaRPr lang="as-IN" dirty="0" smtClean="0"/>
+            <a:endParaRPr lang="as-IN" dirty="0"/>
           </a:p>
           <a:p>
             <a:pPr marL="0" indent="0" algn="ctr">
               <a:buNone/>
             </a:pPr>
             <a:r>
-              <a:rPr lang="as-IN" dirty="0" smtClean="0"/>
-              <a:t>তবে অবশ্যই সময় দিতে হবে ৬-৮ ঘন্টা। মিনিমাম ৩-৫ ঘন্টা।</a:t>
+              <a:rPr lang="as-IN" dirty="0"/>
+              <a:t>তবে অবশ্যই সময় দিতে হবে ৪-৬ ঘন্টা। মিনিমাম ৩ ঘন্টা।</a:t>
             </a:r>
             <a:endParaRPr lang="en-US" dirty="0"/>
           </a:p>
@@ -5885,13 +3950,6 @@
   <p:clrMapOvr>
     <a:masterClrMapping/>
   </p:clrMapOvr>
-  <p:timing>
-    <p:tnLst>
-      <p:par>
-        <p:cTn id="1" dur="indefinite" restart="never" nodeType="tmRoot"/>
-      </p:par>
-    </p:tnLst>
-  </p:timing>
 </p:sld>
 </file>
 
@@ -5950,13 +4008,6 @@
   <p:clrMapOvr>
     <a:masterClrMapping/>
   </p:clrMapOvr>
-  <p:timing>
-    <p:tnLst>
-      <p:par>
-        <p:cTn id="1" dur="indefinite" restart="never" nodeType="tmRoot"/>
-      </p:par>
-    </p:tnLst>
-  </p:timing>
 </p:sld>
 </file>
 
@@ -6011,7 +4062,12 @@
             <p:ph idx="1"/>
           </p:nvPr>
         </p:nvSpPr>
-        <p:spPr/>
+        <p:spPr>
+          <a:xfrm>
+            <a:off x="838200" y="1825625"/>
+            <a:ext cx="10515600" cy="3125516"/>
+          </a:xfrm>
+        </p:spPr>
         <p:txBody>
           <a:bodyPr/>
           <a:lstStyle/>
@@ -6021,13 +4077,17 @@
             </a:pPr>
             <a:r>
               <a:rPr lang="as-IN" dirty="0"/>
-              <a:t>শুধু ক্লাসে উপস্থিত থাকলে হবে না। সাথে সাথে বাসায় ক্লাসের টপিক গুলো বারবার অনুশীলন করতে হবে ভিডিও দেখে দেখে এবং এসাইনমেন্ট গুলো শেষ করে জমা দিতে হবে</a:t>
-            </a:r>
-            <a:r>
-              <a:rPr lang="as-IN" dirty="0" smtClean="0"/>
-              <a:t>।</a:t>
-            </a:r>
-            <a:endParaRPr lang="en-US" dirty="0" smtClean="0"/>
+              <a:t>শুধু ক্লাসে উপস্থিত থাকলে হবে না। সাথে সাথে বাসায়</a:t>
+            </a:r>
+            <a:r>
+              <a:rPr lang="en-US" dirty="0"/>
+              <a:t> </a:t>
+            </a:r>
+            <a:r>
+              <a:rPr lang="as-IN" dirty="0"/>
+              <a:t>ভিডিও দেখে দেখে ক্লাসের টপিক গুলো বারবার অনুশীলন করতে হবে এবং এসাইনমেন্ট গুলো শেষ করে জমা দিতে হবে।এবং আপনাদের অনেক গুলো এক্সাম হবে। </a:t>
+            </a:r>
+            <a:endParaRPr lang="en-US" dirty="0"/>
           </a:p>
           <a:p>
             <a:pPr marL="0" indent="0">
@@ -6043,6 +4103,12 @@
               <a:rPr lang="as-IN" dirty="0"/>
               <a:t>কোথাও না বুঝলে বা আটকে গেলে। আমাদের ফেইসবুক গরূপে প্রশ্ন করতে পারবে।</a:t>
             </a:r>
+            <a:endParaRPr lang="en-US" dirty="0"/>
+          </a:p>
+          <a:p>
+            <a:pPr marL="0" indent="0" algn="ctr">
+              <a:buNone/>
+            </a:pPr>
             <a:endParaRPr lang="en-US" dirty="0"/>
           </a:p>
         </p:txBody>
@@ -6057,13 +4123,6 @@
   <p:clrMapOvr>
     <a:masterClrMapping/>
   </p:clrMapOvr>
-  <p:timing>
-    <p:tnLst>
-      <p:par>
-        <p:cTn id="1" dur="indefinite" restart="never" nodeType="tmRoot"/>
-      </p:par>
-    </p:tnLst>
-  </p:timing>
 </p:sld>
 </file>
 
@@ -6126,39 +4185,31 @@
             <a:pPr marL="0" indent="0" algn="ctr">
               <a:buNone/>
             </a:pPr>
-            <a:endParaRPr lang="en-US" dirty="0" smtClean="0"/>
+            <a:endParaRPr lang="en-US" dirty="0"/>
           </a:p>
           <a:p>
             <a:pPr marL="0" indent="0" algn="ctr">
               <a:buNone/>
             </a:pPr>
             <a:r>
-              <a:rPr lang="as-IN" dirty="0" smtClean="0"/>
-              <a:t>যারা </a:t>
-            </a:r>
-            <a:r>
               <a:rPr lang="as-IN" dirty="0"/>
-              <a:t>নিদৃস্ট সময়ের মধ্যে ডেডিকেটেড ভাবে লেগে থেকে কোর্স শেষ করবে। এসাইনমেন্ট সঠিক সময়ে সাবমিট করবে তাদেরকে নিয়ে আমি জব ইন্টারভিউ প্রস্তুতি বিষয়ক আলাদা গাইড করবো। </a:t>
-            </a:r>
-            <a:endParaRPr lang="en-US" dirty="0" smtClean="0"/>
+              <a:t>যারা নিদৃস্ট সময়ের মধ্যে ডেডিকেটেড ভাবে লেগে থেকে কোর্স শেষ করবে। এসাইনমেন্ট সঠিক সময়ে সাবমিট করবে তাদেরকে নিয়ে আমি জব ইন্টারভিউ প্রস্তুতি বিষয়ক আলাদা গাইড করবো। </a:t>
+            </a:r>
+            <a:endParaRPr lang="en-US" dirty="0"/>
           </a:p>
           <a:p>
             <a:pPr marL="0" indent="0" algn="ctr">
               <a:buNone/>
             </a:pPr>
-            <a:endParaRPr lang="en-US" dirty="0" smtClean="0"/>
+            <a:endParaRPr lang="en-US" dirty="0"/>
           </a:p>
           <a:p>
             <a:pPr marL="0" indent="0" algn="ctr">
               <a:buNone/>
             </a:pPr>
             <a:r>
-              <a:rPr lang="as-IN" dirty="0" smtClean="0"/>
-              <a:t>এর </a:t>
-            </a:r>
-            <a:r>
               <a:rPr lang="as-IN" dirty="0"/>
-              <a:t>জন্য হার্ডওয়ার্ক ছাড়া আলাদা কোন ফি নেই।</a:t>
+              <a:t>এর জন্য হার্ডওয়ার্ক ছাড়া আলাদা কোন ফি নেই।</a:t>
             </a:r>
             <a:endParaRPr lang="en-US" dirty="0"/>
           </a:p>
@@ -6174,13 +4225,6 @@
   <p:clrMapOvr>
     <a:masterClrMapping/>
   </p:clrMapOvr>
-  <p:timing>
-    <p:tnLst>
-      <p:par>
-        <p:cTn id="1" dur="indefinite" restart="never" nodeType="tmRoot"/>
-      </p:par>
-    </p:tnLst>
-  </p:timing>
 </p:sld>
 </file>
 
@@ -6201,947 +4245,51 @@
           <a:chExt cx="0" cy="0"/>
         </a:xfrm>
       </p:grpSpPr>
-      <p:sp>
-        <p:nvSpPr>
-          <p:cNvPr id="2" name="Title 1"/>
-          <p:cNvSpPr>
-            <a:spLocks noGrp="1"/>
-          </p:cNvSpPr>
-          <p:nvPr>
-            <p:ph type="title"/>
-          </p:nvPr>
-        </p:nvSpPr>
-        <p:spPr/>
-        <p:txBody>
-          <a:bodyPr>
-            <a:normAutofit/>
-          </a:bodyPr>
-          <a:lstStyle/>
-          <a:p>
-            <a:pPr algn="ctr"/>
-            <a:r>
-              <a:rPr lang="as-IN" b="1" dirty="0"/>
-              <a:t>কোর্সে যা কিছু </a:t>
-            </a:r>
-            <a:r>
-              <a:rPr lang="as-IN" b="1" dirty="0" smtClean="0"/>
-              <a:t>আছে</a:t>
-            </a:r>
-            <a:endParaRPr lang="en-US" dirty="0"/>
-          </a:p>
-        </p:txBody>
-      </p:sp>
-      <p:graphicFrame>
-        <p:nvGraphicFramePr>
-          <p:cNvPr id="5" name="Content Placeholder 4"/>
-          <p:cNvGraphicFramePr>
-            <a:graphicFrameLocks noGrp="1"/>
-          </p:cNvGraphicFramePr>
+      <p:pic>
+        <p:nvPicPr>
+          <p:cNvPr id="5" name="Content Placeholder 4">
+            <a:extLst>
+              <a:ext uri="{FF2B5EF4-FFF2-40B4-BE49-F238E27FC236}">
+                <a16:creationId xmlns:a16="http://schemas.microsoft.com/office/drawing/2014/main" id="{1DD89A97-B7E4-EACC-F6EB-E56619FDE248}"/>
+              </a:ext>
+            </a:extLst>
+          </p:cNvPr>
+          <p:cNvPicPr>
+            <a:picLocks noGrp="1" noChangeAspect="1"/>
+          </p:cNvPicPr>
           <p:nvPr>
             <p:ph idx="1"/>
-            <p:extLst>
-              <p:ext uri="{D42A27DB-BD31-4B8C-83A1-F6EECF244321}">
-                <p14:modId xmlns:p14="http://schemas.microsoft.com/office/powerpoint/2010/main" val="1080658834"/>
-              </p:ext>
-            </p:extLst>
-          </p:nvPr>
-        </p:nvGraphicFramePr>
-        <p:xfrm>
-          <a:off x="838200" y="1825625"/>
-          <a:ext cx="10515600" cy="4861560"/>
-        </p:xfrm>
-        <a:graphic>
-          <a:graphicData uri="http://schemas.openxmlformats.org/drawingml/2006/table">
-            <a:tbl>
-              <a:tblPr firstRow="1" bandRow="1">
-                <a:tableStyleId>{8799B23B-EC83-4686-B30A-512413B5E67A}</a:tableStyleId>
-              </a:tblPr>
-              <a:tblGrid>
-                <a:gridCol w="2310353">
-                  <a:extLst>
-                    <a:ext uri="{9D8B030D-6E8A-4147-A177-3AD203B41FA5}">
-                      <a16:colId xmlns:a16="http://schemas.microsoft.com/office/drawing/2014/main" val="3426547725"/>
-                    </a:ext>
-                  </a:extLst>
-                </a:gridCol>
-                <a:gridCol w="8205247">
-                  <a:extLst>
-                    <a:ext uri="{9D8B030D-6E8A-4147-A177-3AD203B41FA5}">
-                      <a16:colId xmlns:a16="http://schemas.microsoft.com/office/drawing/2014/main" val="1789073298"/>
-                    </a:ext>
-                  </a:extLst>
-                </a:gridCol>
-              </a:tblGrid>
-              <a:tr h="370840">
-                <a:tc>
-                  <a:txBody>
-                    <a:bodyPr/>
-                    <a:lstStyle/>
-                    <a:p>
-                      <a:r>
-                        <a:rPr lang="en-US" dirty="0" smtClean="0"/>
-                        <a:t>Class – 01</a:t>
-                      </a:r>
-                      <a:endParaRPr lang="en-US" dirty="0"/>
-                    </a:p>
-                  </a:txBody>
-                  <a:tcPr/>
-                </a:tc>
-                <a:tc>
-                  <a:txBody>
-                    <a:bodyPr/>
-                    <a:lstStyle/>
-                    <a:p>
-                      <a:pPr marL="285750" marR="0" lvl="0" indent="-285750" algn="l" defTabSz="914400" rtl="0" eaLnBrk="1" fontAlgn="auto" latinLnBrk="0" hangingPunct="1">
-                        <a:lnSpc>
-                          <a:spcPct val="100000"/>
-                        </a:lnSpc>
-                        <a:spcBef>
-                          <a:spcPts val="0"/>
-                        </a:spcBef>
-                        <a:spcAft>
-                          <a:spcPts val="0"/>
-                        </a:spcAft>
-                        <a:buClrTx/>
-                        <a:buSzTx/>
-                        <a:buFont typeface="Wingdings" panose="05000000000000000000" pitchFamily="2" charset="2"/>
-                        <a:buChar char="ü"/>
-                        <a:tabLst/>
-                        <a:defRPr/>
-                      </a:pPr>
-                      <a:r>
-                        <a:rPr lang="en-US" sz="1800" b="0" i="0" kern="1200" dirty="0" smtClean="0">
-                          <a:solidFill>
-                            <a:schemeClr val="tx1"/>
-                          </a:solidFill>
-                          <a:effectLst/>
-                          <a:latin typeface="+mn-lt"/>
-                          <a:ea typeface="+mn-ea"/>
-                          <a:cs typeface="+mn-cs"/>
-                        </a:rPr>
-                        <a:t>Orientation class</a:t>
-                      </a:r>
-                    </a:p>
-                  </a:txBody>
-                  <a:tcPr/>
-                </a:tc>
-                <a:extLst>
-                  <a:ext uri="{0D108BD9-81ED-4DB2-BD59-A6C34878D82A}">
-                    <a16:rowId xmlns:a16="http://schemas.microsoft.com/office/drawing/2014/main" val="3516644180"/>
-                  </a:ext>
-                </a:extLst>
-              </a:tr>
-              <a:tr h="370840">
-                <a:tc>
-                  <a:txBody>
-                    <a:bodyPr/>
-                    <a:lstStyle/>
-                    <a:p>
-                      <a:pPr marL="0" marR="0" lvl="0" indent="0" algn="l" defTabSz="914400" rtl="0" eaLnBrk="1" fontAlgn="auto" latinLnBrk="0" hangingPunct="1">
-                        <a:lnSpc>
-                          <a:spcPct val="100000"/>
-                        </a:lnSpc>
-                        <a:spcBef>
-                          <a:spcPts val="0"/>
-                        </a:spcBef>
-                        <a:spcAft>
-                          <a:spcPts val="0"/>
-                        </a:spcAft>
-                        <a:buClrTx/>
-                        <a:buSzTx/>
-                        <a:buFontTx/>
-                        <a:buNone/>
-                        <a:tabLst/>
-                        <a:defRPr/>
-                      </a:pPr>
-                      <a:r>
-                        <a:rPr lang="en-US" dirty="0" smtClean="0"/>
-                        <a:t>Class – 02</a:t>
-                      </a:r>
-                      <a:r>
-                        <a:rPr lang="en-US" baseline="0" dirty="0" smtClean="0"/>
-                        <a:t> </a:t>
-                      </a:r>
-                      <a:endParaRPr lang="en-US" dirty="0" smtClean="0"/>
-                    </a:p>
-                  </a:txBody>
-                  <a:tcPr/>
-                </a:tc>
-                <a:tc>
-                  <a:txBody>
-                    <a:bodyPr/>
-                    <a:lstStyle/>
-                    <a:p>
-                      <a:pPr marL="285750" indent="-285750">
-                        <a:buFont typeface="Wingdings" panose="05000000000000000000" pitchFamily="2" charset="2"/>
-                        <a:buChar char="ü"/>
-                      </a:pPr>
-                      <a:r>
-                        <a:rPr lang="en-US" dirty="0" smtClean="0"/>
-                        <a:t>Intro Programming Language</a:t>
-                      </a:r>
-                    </a:p>
-                    <a:p>
-                      <a:pPr marL="285750" indent="-285750">
-                        <a:buFont typeface="Wingdings" panose="05000000000000000000" pitchFamily="2" charset="2"/>
-                        <a:buChar char="ü"/>
-                      </a:pPr>
-                      <a:r>
-                        <a:rPr lang="en-US" dirty="0" smtClean="0"/>
-                        <a:t>Intro Python Programming</a:t>
-                      </a:r>
-                    </a:p>
-                    <a:p>
-                      <a:pPr marL="285750" indent="-285750">
-                        <a:buFont typeface="Wingdings" panose="05000000000000000000" pitchFamily="2" charset="2"/>
-                        <a:buChar char="ü"/>
-                      </a:pPr>
-                      <a:r>
-                        <a:rPr lang="en-US" dirty="0" smtClean="0"/>
-                        <a:t>Python History</a:t>
-                      </a:r>
-                    </a:p>
-                    <a:p>
-                      <a:pPr marL="285750" indent="-285750">
-                        <a:buFont typeface="Wingdings" panose="05000000000000000000" pitchFamily="2" charset="2"/>
-                        <a:buChar char="ü"/>
-                      </a:pPr>
-                      <a:r>
-                        <a:rPr lang="en-US" dirty="0" smtClean="0"/>
-                        <a:t>Python Pros and Cons</a:t>
-                      </a:r>
-                    </a:p>
-                    <a:p>
-                      <a:pPr marL="285750" indent="-285750">
-                        <a:buFont typeface="Wingdings" panose="05000000000000000000" pitchFamily="2" charset="2"/>
-                        <a:buChar char="ü"/>
-                      </a:pPr>
-                      <a:r>
-                        <a:rPr lang="en-US" dirty="0" smtClean="0"/>
-                        <a:t>How to code and debug?</a:t>
-                      </a:r>
-                    </a:p>
-                    <a:p>
-                      <a:pPr marL="285750" indent="-285750">
-                        <a:buFont typeface="Wingdings" panose="05000000000000000000" pitchFamily="2" charset="2"/>
-                        <a:buChar char="ü"/>
-                      </a:pPr>
-                      <a:r>
-                        <a:rPr lang="en-US" dirty="0" smtClean="0"/>
-                        <a:t>Environment Setup</a:t>
-                      </a:r>
-                      <a:endParaRPr lang="en-US" dirty="0"/>
-                    </a:p>
-                  </a:txBody>
-                  <a:tcPr/>
-                </a:tc>
-                <a:extLst>
-                  <a:ext uri="{0D108BD9-81ED-4DB2-BD59-A6C34878D82A}">
-                    <a16:rowId xmlns:a16="http://schemas.microsoft.com/office/drawing/2014/main" val="2809002101"/>
-                  </a:ext>
-                </a:extLst>
-              </a:tr>
-              <a:tr h="370840">
-                <a:tc>
-                  <a:txBody>
-                    <a:bodyPr/>
-                    <a:lstStyle/>
-                    <a:p>
-                      <a:pPr marL="0" marR="0" lvl="0" indent="0" algn="l" defTabSz="914400" rtl="0" eaLnBrk="1" fontAlgn="auto" latinLnBrk="0" hangingPunct="1">
-                        <a:lnSpc>
-                          <a:spcPct val="100000"/>
-                        </a:lnSpc>
-                        <a:spcBef>
-                          <a:spcPts val="0"/>
-                        </a:spcBef>
-                        <a:spcAft>
-                          <a:spcPts val="0"/>
-                        </a:spcAft>
-                        <a:buClrTx/>
-                        <a:buSzTx/>
-                        <a:buFontTx/>
-                        <a:buNone/>
-                        <a:tabLst/>
-                        <a:defRPr/>
-                      </a:pPr>
-                      <a:r>
-                        <a:rPr lang="en-US" dirty="0" smtClean="0"/>
-                        <a:t>Class - 03</a:t>
-                      </a:r>
-                    </a:p>
-                  </a:txBody>
-                  <a:tcPr/>
-                </a:tc>
-                <a:tc>
-                  <a:txBody>
-                    <a:bodyPr/>
-                    <a:lstStyle/>
-                    <a:p>
-                      <a:pPr marL="285750" indent="-285750">
-                        <a:buFont typeface="Wingdings" panose="05000000000000000000" pitchFamily="2" charset="2"/>
-                        <a:buChar char="ü"/>
-                      </a:pPr>
-                      <a:r>
-                        <a:rPr lang="en-US" dirty="0" smtClean="0"/>
-                        <a:t>Variable</a:t>
-                      </a:r>
-                    </a:p>
-                    <a:p>
-                      <a:pPr marL="285750" indent="-285750">
-                        <a:buFont typeface="Wingdings" panose="05000000000000000000" pitchFamily="2" charset="2"/>
-                        <a:buChar char="ü"/>
-                      </a:pPr>
-                      <a:r>
-                        <a:rPr lang="en-US" dirty="0" smtClean="0"/>
-                        <a:t>Data type</a:t>
-                      </a:r>
-                    </a:p>
-                    <a:p>
-                      <a:pPr marL="285750" indent="-285750">
-                        <a:buFont typeface="Wingdings" panose="05000000000000000000" pitchFamily="2" charset="2"/>
-                        <a:buChar char="ü"/>
-                      </a:pPr>
-                      <a:r>
-                        <a:rPr lang="en-US" dirty="0" smtClean="0"/>
-                        <a:t>Typecasting</a:t>
-                      </a:r>
-                    </a:p>
-                    <a:p>
-                      <a:pPr marL="285750" indent="-285750">
-                        <a:buFont typeface="Wingdings" panose="05000000000000000000" pitchFamily="2" charset="2"/>
-                        <a:buChar char="ü"/>
-                      </a:pPr>
-                      <a:r>
-                        <a:rPr lang="en-US" dirty="0" smtClean="0"/>
-                        <a:t>Comments</a:t>
-                      </a:r>
-                    </a:p>
-                    <a:p>
-                      <a:pPr marL="285750" indent="-285750">
-                        <a:buFont typeface="Wingdings" panose="05000000000000000000" pitchFamily="2" charset="2"/>
-                        <a:buChar char="ü"/>
-                      </a:pPr>
-                      <a:r>
-                        <a:rPr lang="en-US" dirty="0" smtClean="0"/>
-                        <a:t>Keywords</a:t>
-                      </a:r>
-                    </a:p>
-                    <a:p>
-                      <a:pPr marL="285750" indent="-285750">
-                        <a:buFont typeface="Wingdings" panose="05000000000000000000" pitchFamily="2" charset="2"/>
-                        <a:buChar char="ü"/>
-                      </a:pPr>
-                      <a:r>
-                        <a:rPr lang="en-US" dirty="0" smtClean="0"/>
-                        <a:t>Reference</a:t>
-                      </a:r>
-                    </a:p>
-                    <a:p>
-                      <a:pPr marL="285750" indent="-285750">
-                        <a:buFont typeface="Wingdings" panose="05000000000000000000" pitchFamily="2" charset="2"/>
-                        <a:buChar char="ü"/>
-                      </a:pPr>
-                      <a:r>
-                        <a:rPr lang="en-US" dirty="0" smtClean="0"/>
-                        <a:t>Input and Output</a:t>
-                      </a:r>
-                      <a:endParaRPr lang="en-US" dirty="0"/>
-                    </a:p>
-                  </a:txBody>
-                  <a:tcPr/>
-                </a:tc>
-                <a:extLst>
-                  <a:ext uri="{0D108BD9-81ED-4DB2-BD59-A6C34878D82A}">
-                    <a16:rowId xmlns:a16="http://schemas.microsoft.com/office/drawing/2014/main" val="2030110755"/>
-                  </a:ext>
-                </a:extLst>
-              </a:tr>
-              <a:tr h="370840">
-                <a:tc>
-                  <a:txBody>
-                    <a:bodyPr/>
-                    <a:lstStyle/>
-                    <a:p>
-                      <a:pPr marL="0" marR="0" lvl="0" indent="0" algn="l" defTabSz="914400" rtl="0" eaLnBrk="1" fontAlgn="auto" latinLnBrk="0" hangingPunct="1">
-                        <a:lnSpc>
-                          <a:spcPct val="100000"/>
-                        </a:lnSpc>
-                        <a:spcBef>
-                          <a:spcPts val="0"/>
-                        </a:spcBef>
-                        <a:spcAft>
-                          <a:spcPts val="0"/>
-                        </a:spcAft>
-                        <a:buClrTx/>
-                        <a:buSzTx/>
-                        <a:buFontTx/>
-                        <a:buNone/>
-                        <a:tabLst/>
-                        <a:defRPr/>
-                      </a:pPr>
-                      <a:r>
-                        <a:rPr lang="en-US" dirty="0" smtClean="0"/>
-                        <a:t>Class - 04</a:t>
-                      </a:r>
-                    </a:p>
-                  </a:txBody>
-                  <a:tcPr/>
-                </a:tc>
-                <a:tc>
-                  <a:txBody>
-                    <a:bodyPr/>
-                    <a:lstStyle/>
-                    <a:p>
-                      <a:pPr marL="285750" indent="-285750">
-                        <a:buFont typeface="Wingdings" panose="05000000000000000000" pitchFamily="2" charset="2"/>
-                        <a:buChar char="ü"/>
-                      </a:pPr>
-                      <a:r>
-                        <a:rPr lang="en-US" dirty="0" smtClean="0"/>
-                        <a:t>Python Operators</a:t>
-                      </a:r>
-                      <a:endParaRPr lang="en-US" dirty="0"/>
-                    </a:p>
-                  </a:txBody>
-                  <a:tcPr/>
-                </a:tc>
-                <a:extLst>
-                  <a:ext uri="{0D108BD9-81ED-4DB2-BD59-A6C34878D82A}">
-                    <a16:rowId xmlns:a16="http://schemas.microsoft.com/office/drawing/2014/main" val="2987372473"/>
-                  </a:ext>
-                </a:extLst>
-              </a:tr>
-              <a:tr h="370840">
-                <a:tc>
-                  <a:txBody>
-                    <a:bodyPr/>
-                    <a:lstStyle/>
-                    <a:p>
-                      <a:pPr marL="0" marR="0" lvl="0" indent="0" algn="l" defTabSz="914400" rtl="0" eaLnBrk="1" fontAlgn="auto" latinLnBrk="0" hangingPunct="1">
-                        <a:lnSpc>
-                          <a:spcPct val="100000"/>
-                        </a:lnSpc>
-                        <a:spcBef>
-                          <a:spcPts val="0"/>
-                        </a:spcBef>
-                        <a:spcAft>
-                          <a:spcPts val="0"/>
-                        </a:spcAft>
-                        <a:buClrTx/>
-                        <a:buSzTx/>
-                        <a:buFontTx/>
-                        <a:buNone/>
-                        <a:tabLst/>
-                        <a:defRPr/>
-                      </a:pPr>
-                      <a:r>
-                        <a:rPr lang="en-US" dirty="0" smtClean="0"/>
-                        <a:t>Class - 05</a:t>
-                      </a:r>
-                    </a:p>
-                  </a:txBody>
-                  <a:tcPr/>
-                </a:tc>
-                <a:tc>
-                  <a:txBody>
-                    <a:bodyPr/>
-                    <a:lstStyle/>
-                    <a:p>
-                      <a:pPr marL="285750" indent="-285750">
-                        <a:buFont typeface="Wingdings" panose="05000000000000000000" pitchFamily="2" charset="2"/>
-                        <a:buChar char="ü"/>
-                      </a:pPr>
-                      <a:r>
-                        <a:rPr lang="en-US" dirty="0" smtClean="0"/>
-                        <a:t>Python Strings</a:t>
-                      </a:r>
-                    </a:p>
-                  </a:txBody>
-                  <a:tcPr/>
-                </a:tc>
-                <a:extLst>
-                  <a:ext uri="{0D108BD9-81ED-4DB2-BD59-A6C34878D82A}">
-                    <a16:rowId xmlns:a16="http://schemas.microsoft.com/office/drawing/2014/main" val="3960950384"/>
-                  </a:ext>
-                </a:extLst>
-              </a:tr>
-            </a:tbl>
-          </a:graphicData>
-        </a:graphic>
-      </p:graphicFrame>
+          </p:nvPr>
+        </p:nvPicPr>
+        <p:blipFill>
+          <a:blip r:embed="rId2">
+            <a:extLst>
+              <a:ext uri="{28A0092B-C50C-407E-A947-70E740481C1C}">
+                <a14:useLocalDpi xmlns:a14="http://schemas.microsoft.com/office/drawing/2010/main" val="0"/>
+              </a:ext>
+            </a:extLst>
+          </a:blip>
+          <a:stretch>
+            <a:fillRect/>
+          </a:stretch>
+        </p:blipFill>
+        <p:spPr>
+          <a:xfrm>
+            <a:off x="1997738" y="844317"/>
+            <a:ext cx="7750474" cy="4909711"/>
+          </a:xfrm>
+        </p:spPr>
+      </p:pic>
     </p:spTree>
     <p:extLst>
       <p:ext uri="{BB962C8B-B14F-4D97-AF65-F5344CB8AC3E}">
-        <p14:creationId xmlns:p14="http://schemas.microsoft.com/office/powerpoint/2010/main" val="3106305335"/>
+        <p14:creationId xmlns:p14="http://schemas.microsoft.com/office/powerpoint/2010/main" val="599879113"/>
       </p:ext>
     </p:extLst>
   </p:cSld>
   <p:clrMapOvr>
     <a:masterClrMapping/>
   </p:clrMapOvr>
-  <p:timing>
-    <p:tnLst>
-      <p:par>
-        <p:cTn id="1" dur="indefinite" restart="never" nodeType="tmRoot"/>
-      </p:par>
-    </p:tnLst>
-  </p:timing>
-</p:sld>
-</file>
-
-<file path=ppt/slides/slide9.xml><?xml version="1.0" encoding="utf-8"?>
-<p:sld xmlns:a="http://schemas.openxmlformats.org/drawingml/2006/main" xmlns:r="http://schemas.openxmlformats.org/officeDocument/2006/relationships" xmlns:p="http://schemas.openxmlformats.org/presentationml/2006/main">
-  <p:cSld>
-    <p:spTree>
-      <p:nvGrpSpPr>
-        <p:cNvPr id="1" name=""/>
-        <p:cNvGrpSpPr/>
-        <p:nvPr/>
-      </p:nvGrpSpPr>
-      <p:grpSpPr>
-        <a:xfrm>
-          <a:off x="0" y="0"/>
-          <a:ext cx="0" cy="0"/>
-          <a:chOff x="0" y="0"/>
-          <a:chExt cx="0" cy="0"/>
-        </a:xfrm>
-      </p:grpSpPr>
-      <p:sp>
-        <p:nvSpPr>
-          <p:cNvPr id="2" name="Title 1"/>
-          <p:cNvSpPr>
-            <a:spLocks noGrp="1"/>
-          </p:cNvSpPr>
-          <p:nvPr>
-            <p:ph type="title"/>
-          </p:nvPr>
-        </p:nvSpPr>
-        <p:spPr/>
-        <p:txBody>
-          <a:bodyPr/>
-          <a:lstStyle/>
-          <a:p>
-            <a:pPr algn="ctr"/>
-            <a:r>
-              <a:rPr lang="as-IN" b="1" dirty="0" smtClean="0"/>
-              <a:t>কোর্সে যা কিছু আছে</a:t>
-            </a:r>
-            <a:endParaRPr lang="en-US" dirty="0"/>
-          </a:p>
-        </p:txBody>
-      </p:sp>
-      <p:graphicFrame>
-        <p:nvGraphicFramePr>
-          <p:cNvPr id="4" name="Content Placeholder 3"/>
-          <p:cNvGraphicFramePr>
-            <a:graphicFrameLocks noGrp="1"/>
-          </p:cNvGraphicFramePr>
-          <p:nvPr>
-            <p:ph idx="1"/>
-            <p:extLst>
-              <p:ext uri="{D42A27DB-BD31-4B8C-83A1-F6EECF244321}">
-                <p14:modId xmlns:p14="http://schemas.microsoft.com/office/powerpoint/2010/main" val="675531650"/>
-              </p:ext>
-            </p:extLst>
-          </p:nvPr>
-        </p:nvGraphicFramePr>
-        <p:xfrm>
-          <a:off x="838200" y="1825625"/>
-          <a:ext cx="10515600" cy="4058920"/>
-        </p:xfrm>
-        <a:graphic>
-          <a:graphicData uri="http://schemas.openxmlformats.org/drawingml/2006/table">
-            <a:tbl>
-              <a:tblPr firstRow="1" bandRow="1">
-                <a:tableStyleId>{8799B23B-EC83-4686-B30A-512413B5E67A}</a:tableStyleId>
-              </a:tblPr>
-              <a:tblGrid>
-                <a:gridCol w="2640291">
-                  <a:extLst>
-                    <a:ext uri="{9D8B030D-6E8A-4147-A177-3AD203B41FA5}">
-                      <a16:colId xmlns:a16="http://schemas.microsoft.com/office/drawing/2014/main" val="119400389"/>
-                    </a:ext>
-                  </a:extLst>
-                </a:gridCol>
-                <a:gridCol w="7875309">
-                  <a:extLst>
-                    <a:ext uri="{9D8B030D-6E8A-4147-A177-3AD203B41FA5}">
-                      <a16:colId xmlns:a16="http://schemas.microsoft.com/office/drawing/2014/main" val="1918490653"/>
-                    </a:ext>
-                  </a:extLst>
-                </a:gridCol>
-              </a:tblGrid>
-              <a:tr h="370840">
-                <a:tc>
-                  <a:txBody>
-                    <a:bodyPr/>
-                    <a:lstStyle/>
-                    <a:p>
-                      <a:r>
-                        <a:rPr lang="en-US" dirty="0" smtClean="0"/>
-                        <a:t>Class – 06 </a:t>
-                      </a:r>
-                      <a:endParaRPr lang="en-US" dirty="0"/>
-                    </a:p>
-                  </a:txBody>
-                  <a:tcPr/>
-                </a:tc>
-                <a:tc>
-                  <a:txBody>
-                    <a:bodyPr/>
-                    <a:lstStyle/>
-                    <a:p>
-                      <a:pPr marL="285750" indent="-285750">
-                        <a:buFont typeface="Wingdings" panose="05000000000000000000" pitchFamily="2" charset="2"/>
-                        <a:buChar char="ü"/>
-                      </a:pPr>
-                      <a:r>
-                        <a:rPr lang="en-US" dirty="0" smtClean="0"/>
-                        <a:t>Python List</a:t>
-                      </a:r>
-                      <a:endParaRPr lang="en-US" dirty="0"/>
-                    </a:p>
-                  </a:txBody>
-                  <a:tcPr/>
-                </a:tc>
-                <a:extLst>
-                  <a:ext uri="{0D108BD9-81ED-4DB2-BD59-A6C34878D82A}">
-                    <a16:rowId xmlns:a16="http://schemas.microsoft.com/office/drawing/2014/main" val="1548554150"/>
-                  </a:ext>
-                </a:extLst>
-              </a:tr>
-              <a:tr h="370840">
-                <a:tc>
-                  <a:txBody>
-                    <a:bodyPr/>
-                    <a:lstStyle/>
-                    <a:p>
-                      <a:r>
-                        <a:rPr lang="en-US" dirty="0" smtClean="0"/>
-                        <a:t>Class – 07</a:t>
-                      </a:r>
-                      <a:endParaRPr lang="en-US" dirty="0"/>
-                    </a:p>
-                  </a:txBody>
-                  <a:tcPr/>
-                </a:tc>
-                <a:tc>
-                  <a:txBody>
-                    <a:bodyPr/>
-                    <a:lstStyle/>
-                    <a:p>
-                      <a:pPr marL="285750" indent="-285750">
-                        <a:buFont typeface="Wingdings" panose="05000000000000000000" pitchFamily="2" charset="2"/>
-                        <a:buChar char="ü"/>
-                      </a:pPr>
-                      <a:r>
-                        <a:rPr lang="en-US" dirty="0" smtClean="0"/>
-                        <a:t>Python Tuple</a:t>
-                      </a:r>
-                      <a:endParaRPr lang="en-US" dirty="0"/>
-                    </a:p>
-                  </a:txBody>
-                  <a:tcPr/>
-                </a:tc>
-                <a:extLst>
-                  <a:ext uri="{0D108BD9-81ED-4DB2-BD59-A6C34878D82A}">
-                    <a16:rowId xmlns:a16="http://schemas.microsoft.com/office/drawing/2014/main" val="495141998"/>
-                  </a:ext>
-                </a:extLst>
-              </a:tr>
-              <a:tr h="370840">
-                <a:tc>
-                  <a:txBody>
-                    <a:bodyPr/>
-                    <a:lstStyle/>
-                    <a:p>
-                      <a:r>
-                        <a:rPr lang="en-US" dirty="0" smtClean="0"/>
-                        <a:t>Class – 08</a:t>
-                      </a:r>
-                      <a:endParaRPr lang="en-US" dirty="0"/>
-                    </a:p>
-                  </a:txBody>
-                  <a:tcPr/>
-                </a:tc>
-                <a:tc>
-                  <a:txBody>
-                    <a:bodyPr/>
-                    <a:lstStyle/>
-                    <a:p>
-                      <a:pPr marL="285750" indent="-285750">
-                        <a:buFont typeface="Wingdings" panose="05000000000000000000" pitchFamily="2" charset="2"/>
-                        <a:buChar char="ü"/>
-                      </a:pPr>
-                      <a:r>
-                        <a:rPr lang="en-US" dirty="0" smtClean="0"/>
-                        <a:t>Conditional Statements in Python</a:t>
-                      </a:r>
-                      <a:endParaRPr lang="en-US" dirty="0"/>
-                    </a:p>
-                  </a:txBody>
-                  <a:tcPr/>
-                </a:tc>
-                <a:extLst>
-                  <a:ext uri="{0D108BD9-81ED-4DB2-BD59-A6C34878D82A}">
-                    <a16:rowId xmlns:a16="http://schemas.microsoft.com/office/drawing/2014/main" val="841584468"/>
-                  </a:ext>
-                </a:extLst>
-              </a:tr>
-              <a:tr h="370840">
-                <a:tc>
-                  <a:txBody>
-                    <a:bodyPr/>
-                    <a:lstStyle/>
-                    <a:p>
-                      <a:r>
-                        <a:rPr lang="en-US" dirty="0" smtClean="0"/>
-                        <a:t>Class – 09</a:t>
-                      </a:r>
-                      <a:endParaRPr lang="en-US" dirty="0"/>
-                    </a:p>
-                  </a:txBody>
-                  <a:tcPr/>
-                </a:tc>
-                <a:tc>
-                  <a:txBody>
-                    <a:bodyPr/>
-                    <a:lstStyle/>
-                    <a:p>
-                      <a:pPr marL="285750" indent="-285750">
-                        <a:buFont typeface="Wingdings" panose="05000000000000000000" pitchFamily="2" charset="2"/>
-                        <a:buChar char="ü"/>
-                      </a:pPr>
-                      <a:r>
-                        <a:rPr lang="en-US" dirty="0" smtClean="0"/>
-                        <a:t>Python Sets</a:t>
-                      </a:r>
-                      <a:endParaRPr lang="en-US" dirty="0"/>
-                    </a:p>
-                  </a:txBody>
-                  <a:tcPr/>
-                </a:tc>
-                <a:extLst>
-                  <a:ext uri="{0D108BD9-81ED-4DB2-BD59-A6C34878D82A}">
-                    <a16:rowId xmlns:a16="http://schemas.microsoft.com/office/drawing/2014/main" val="2364725896"/>
-                  </a:ext>
-                </a:extLst>
-              </a:tr>
-              <a:tr h="370840">
-                <a:tc>
-                  <a:txBody>
-                    <a:bodyPr/>
-                    <a:lstStyle/>
-                    <a:p>
-                      <a:r>
-                        <a:rPr lang="en-US" dirty="0" smtClean="0"/>
-                        <a:t>Class – 10</a:t>
-                      </a:r>
-                      <a:endParaRPr lang="en-US" dirty="0"/>
-                    </a:p>
-                  </a:txBody>
-                  <a:tcPr/>
-                </a:tc>
-                <a:tc>
-                  <a:txBody>
-                    <a:bodyPr/>
-                    <a:lstStyle/>
-                    <a:p>
-                      <a:pPr marL="285750" indent="-285750">
-                        <a:buFont typeface="Wingdings" panose="05000000000000000000" pitchFamily="2" charset="2"/>
-                        <a:buChar char="ü"/>
-                      </a:pPr>
-                      <a:r>
-                        <a:rPr lang="en-US" dirty="0" smtClean="0"/>
-                        <a:t>Python Dictionary</a:t>
-                      </a:r>
-                      <a:endParaRPr lang="en-US" dirty="0"/>
-                    </a:p>
-                  </a:txBody>
-                  <a:tcPr/>
-                </a:tc>
-                <a:extLst>
-                  <a:ext uri="{0D108BD9-81ED-4DB2-BD59-A6C34878D82A}">
-                    <a16:rowId xmlns:a16="http://schemas.microsoft.com/office/drawing/2014/main" val="2591072112"/>
-                  </a:ext>
-                </a:extLst>
-              </a:tr>
-              <a:tr h="370840">
-                <a:tc gridSpan="2">
-                  <a:txBody>
-                    <a:bodyPr/>
-                    <a:lstStyle/>
-                    <a:p>
-                      <a:pPr algn="ctr"/>
-                      <a:r>
-                        <a:rPr lang="en-US" dirty="0" smtClean="0"/>
-                        <a:t>Exam : Class 02 To 10 [ 01 Exam</a:t>
-                      </a:r>
-                      <a:endParaRPr lang="en-US" dirty="0"/>
-                    </a:p>
-                  </a:txBody>
-                  <a:tcPr/>
-                </a:tc>
-                <a:tc hMerge="1">
-                  <a:txBody>
-                    <a:bodyPr/>
-                    <a:lstStyle/>
-                    <a:p>
-                      <a:pPr marL="285750" indent="-285750">
-                        <a:buFont typeface="Wingdings" panose="05000000000000000000" pitchFamily="2" charset="2"/>
-                        <a:buChar char="ü"/>
-                      </a:pPr>
-                      <a:endParaRPr lang="en-US" dirty="0"/>
-                    </a:p>
-                  </a:txBody>
-                  <a:tcPr/>
-                </a:tc>
-                <a:extLst>
-                  <a:ext uri="{0D108BD9-81ED-4DB2-BD59-A6C34878D82A}">
-                    <a16:rowId xmlns:a16="http://schemas.microsoft.com/office/drawing/2014/main" val="464192550"/>
-                  </a:ext>
-                </a:extLst>
-              </a:tr>
-              <a:tr h="370840">
-                <a:tc>
-                  <a:txBody>
-                    <a:bodyPr/>
-                    <a:lstStyle/>
-                    <a:p>
-                      <a:r>
-                        <a:rPr lang="en-US" dirty="0" smtClean="0"/>
-                        <a:t>Class – 11, 12, 13</a:t>
-                      </a:r>
-                      <a:endParaRPr lang="en-US" dirty="0"/>
-                    </a:p>
-                  </a:txBody>
-                  <a:tcPr/>
-                </a:tc>
-                <a:tc>
-                  <a:txBody>
-                    <a:bodyPr/>
-                    <a:lstStyle/>
-                    <a:p>
-                      <a:pPr marL="285750" indent="-285750">
-                        <a:buFont typeface="Wingdings" panose="05000000000000000000" pitchFamily="2" charset="2"/>
-                        <a:buChar char="ü"/>
-                      </a:pPr>
-                      <a:r>
-                        <a:rPr lang="en-US" dirty="0" smtClean="0"/>
-                        <a:t>Loop with Range</a:t>
-                      </a:r>
-                    </a:p>
-                    <a:p>
-                      <a:pPr marL="285750" indent="-285750">
-                        <a:buFont typeface="Wingdings" panose="05000000000000000000" pitchFamily="2" charset="2"/>
-                        <a:buChar char="ü"/>
-                      </a:pPr>
-                      <a:r>
-                        <a:rPr lang="en-US" dirty="0" smtClean="0"/>
-                        <a:t>While Loop</a:t>
-                      </a:r>
-                    </a:p>
-                    <a:p>
-                      <a:pPr marL="285750" indent="-285750">
-                        <a:buFont typeface="Wingdings" panose="05000000000000000000" pitchFamily="2" charset="2"/>
-                        <a:buChar char="ü"/>
-                      </a:pPr>
-                      <a:r>
-                        <a:rPr lang="en-US" dirty="0" smtClean="0"/>
-                        <a:t>Break</a:t>
-                      </a:r>
-                    </a:p>
-                    <a:p>
-                      <a:pPr marL="285750" indent="-285750">
-                        <a:buFont typeface="Wingdings" panose="05000000000000000000" pitchFamily="2" charset="2"/>
-                        <a:buChar char="ü"/>
-                      </a:pPr>
-                      <a:r>
-                        <a:rPr lang="en-US" dirty="0" smtClean="0"/>
-                        <a:t>Continue</a:t>
-                      </a:r>
-                    </a:p>
-                    <a:p>
-                      <a:pPr marL="285750" indent="-285750">
-                        <a:buFont typeface="Wingdings" panose="05000000000000000000" pitchFamily="2" charset="2"/>
-                        <a:buChar char="ü"/>
-                      </a:pPr>
-                      <a:r>
-                        <a:rPr lang="en-US" dirty="0" smtClean="0"/>
-                        <a:t>Pass</a:t>
-                      </a:r>
-                      <a:endParaRPr lang="en-US" dirty="0"/>
-                    </a:p>
-                  </a:txBody>
-                  <a:tcPr/>
-                </a:tc>
-                <a:extLst>
-                  <a:ext uri="{0D108BD9-81ED-4DB2-BD59-A6C34878D82A}">
-                    <a16:rowId xmlns:a16="http://schemas.microsoft.com/office/drawing/2014/main" val="1247802854"/>
-                  </a:ext>
-                </a:extLst>
-              </a:tr>
-              <a:tr h="370840">
-                <a:tc gridSpan="2">
-                  <a:txBody>
-                    <a:bodyPr/>
-                    <a:lstStyle/>
-                    <a:p>
-                      <a:pPr algn="ctr"/>
-                      <a:r>
-                        <a:rPr lang="en-US" dirty="0" smtClean="0"/>
-                        <a:t>Exam: Class – 11 To 13</a:t>
-                      </a:r>
-                      <a:r>
-                        <a:rPr lang="en-US" baseline="0" dirty="0" smtClean="0"/>
-                        <a:t> [ Total 7-10 Exam]</a:t>
-                      </a:r>
-                      <a:endParaRPr lang="en-US" dirty="0"/>
-                    </a:p>
-                  </a:txBody>
-                  <a:tcPr/>
-                </a:tc>
-                <a:tc hMerge="1">
-                  <a:txBody>
-                    <a:bodyPr/>
-                    <a:lstStyle/>
-                    <a:p>
-                      <a:pPr marL="285750" indent="-285750">
-                        <a:buFont typeface="Wingdings" panose="05000000000000000000" pitchFamily="2" charset="2"/>
-                        <a:buChar char="ü"/>
-                      </a:pPr>
-                      <a:endParaRPr lang="en-US" dirty="0"/>
-                    </a:p>
-                  </a:txBody>
-                  <a:tcPr/>
-                </a:tc>
-                <a:extLst>
-                  <a:ext uri="{0D108BD9-81ED-4DB2-BD59-A6C34878D82A}">
-                    <a16:rowId xmlns:a16="http://schemas.microsoft.com/office/drawing/2014/main" val="1500340075"/>
-                  </a:ext>
-                </a:extLst>
-              </a:tr>
-            </a:tbl>
-          </a:graphicData>
-        </a:graphic>
-      </p:graphicFrame>
-    </p:spTree>
-    <p:extLst>
-      <p:ext uri="{BB962C8B-B14F-4D97-AF65-F5344CB8AC3E}">
-        <p14:creationId xmlns:p14="http://schemas.microsoft.com/office/powerpoint/2010/main" val="559758694"/>
-      </p:ext>
-    </p:extLst>
-  </p:cSld>
-  <p:clrMapOvr>
-    <a:masterClrMapping/>
-  </p:clrMapOvr>
-  <p:timing>
-    <p:tnLst>
-      <p:par>
-        <p:cTn id="1" dur="indefinite" restart="never" nodeType="tmRoot"/>
-      </p:par>
-    </p:tnLst>
-  </p:timing>
 </p:sld>
 </file>
 

</xml_diff>